<commit_message>
updated the data transfer methods section
</commit_message>
<xml_diff>
--- a/draft/figure/Method/img.pptx
+++ b/draft/figure/Method/img.pptx
@@ -288,7 +288,7 @@
           <a:lstStyle/>
           <a:p>
             <a:fld id="{DC973F95-B674-6E4F-86B5-F8DDA90644BE}" type="datetimeFigureOut">
-              <a:t>2013/01/24</a:t>
+              <a:t>2013/01/29</a:t>
             </a:fld>
             <a:endParaRPr kumimoji="1" lang="ja-JP" altLang="en-US"/>
           </a:p>
@@ -486,7 +486,7 @@
           <a:lstStyle/>
           <a:p>
             <a:fld id="{DC973F95-B674-6E4F-86B5-F8DDA90644BE}" type="datetimeFigureOut">
-              <a:t>2013/01/24</a:t>
+              <a:t>2013/01/29</a:t>
             </a:fld>
             <a:endParaRPr kumimoji="1" lang="ja-JP" altLang="en-US"/>
           </a:p>
@@ -694,7 +694,7 @@
           <a:lstStyle/>
           <a:p>
             <a:fld id="{DC973F95-B674-6E4F-86B5-F8DDA90644BE}" type="datetimeFigureOut">
-              <a:t>2013/01/24</a:t>
+              <a:t>2013/01/29</a:t>
             </a:fld>
             <a:endParaRPr kumimoji="1" lang="ja-JP" altLang="en-US"/>
           </a:p>
@@ -892,7 +892,7 @@
           <a:lstStyle/>
           <a:p>
             <a:fld id="{DC973F95-B674-6E4F-86B5-F8DDA90644BE}" type="datetimeFigureOut">
-              <a:t>2013/01/24</a:t>
+              <a:t>2013/01/29</a:t>
             </a:fld>
             <a:endParaRPr kumimoji="1" lang="ja-JP" altLang="en-US"/>
           </a:p>
@@ -1135,7 +1135,7 @@
           <a:lstStyle/>
           <a:p>
             <a:fld id="{DC973F95-B674-6E4F-86B5-F8DDA90644BE}" type="datetimeFigureOut">
-              <a:t>2013/01/24</a:t>
+              <a:t>2013/01/29</a:t>
             </a:fld>
             <a:endParaRPr kumimoji="1" lang="ja-JP" altLang="en-US"/>
           </a:p>
@@ -1482,7 +1482,7 @@
           <a:lstStyle/>
           <a:p>
             <a:fld id="{DC973F95-B674-6E4F-86B5-F8DDA90644BE}" type="datetimeFigureOut">
-              <a:t>2013/01/24</a:t>
+              <a:t>2013/01/29</a:t>
             </a:fld>
             <a:endParaRPr kumimoji="1" lang="ja-JP" altLang="en-US"/>
           </a:p>
@@ -1963,7 +1963,7 @@
           <a:lstStyle/>
           <a:p>
             <a:fld id="{DC973F95-B674-6E4F-86B5-F8DDA90644BE}" type="datetimeFigureOut">
-              <a:t>2013/01/24</a:t>
+              <a:t>2013/01/29</a:t>
             </a:fld>
             <a:endParaRPr kumimoji="1" lang="ja-JP" altLang="en-US"/>
           </a:p>
@@ -2078,7 +2078,7 @@
           <a:lstStyle/>
           <a:p>
             <a:fld id="{DC973F95-B674-6E4F-86B5-F8DDA90644BE}" type="datetimeFigureOut">
-              <a:t>2013/01/24</a:t>
+              <a:t>2013/01/29</a:t>
             </a:fld>
             <a:endParaRPr kumimoji="1" lang="ja-JP" altLang="en-US"/>
           </a:p>
@@ -2171,7 +2171,7 @@
           <a:lstStyle/>
           <a:p>
             <a:fld id="{DC973F95-B674-6E4F-86B5-F8DDA90644BE}" type="datetimeFigureOut">
-              <a:t>2013/01/24</a:t>
+              <a:t>2013/01/29</a:t>
             </a:fld>
             <a:endParaRPr kumimoji="1" lang="ja-JP" altLang="en-US"/>
           </a:p>
@@ -2476,7 +2476,7 @@
           <a:lstStyle/>
           <a:p>
             <a:fld id="{DC973F95-B674-6E4F-86B5-F8DDA90644BE}" type="datetimeFigureOut">
-              <a:t>2013/01/24</a:t>
+              <a:t>2013/01/29</a:t>
             </a:fld>
             <a:endParaRPr kumimoji="1" lang="ja-JP" altLang="en-US"/>
           </a:p>
@@ -2726,7 +2726,7 @@
           <a:lstStyle/>
           <a:p>
             <a:fld id="{DC973F95-B674-6E4F-86B5-F8DDA90644BE}" type="datetimeFigureOut">
-              <a:t>2013/01/24</a:t>
+              <a:t>2013/01/29</a:t>
             </a:fld>
             <a:endParaRPr kumimoji="1" lang="ja-JP" altLang="en-US"/>
           </a:p>
@@ -2967,7 +2967,7 @@
           </a:lstStyle>
           <a:p>
             <a:fld id="{DC973F95-B674-6E4F-86B5-F8DDA90644BE}" type="datetimeFigureOut">
-              <a:t>2013/01/24</a:t>
+              <a:t>2013/01/29</a:t>
             </a:fld>
             <a:endParaRPr kumimoji="1" lang="ja-JP" altLang="en-US"/>
           </a:p>
@@ -3343,68 +3343,6 @@
       </p:grpSpPr>
       <p:sp>
         <p:nvSpPr>
-          <p:cNvPr id="35" name="正方形/長方形 34"/>
-          <p:cNvSpPr/>
-          <p:nvPr/>
-        </p:nvSpPr>
-        <p:spPr>
-          <a:xfrm>
-            <a:off x="6119910" y="5119786"/>
-            <a:ext cx="1806743" cy="1277361"/>
-          </a:xfrm>
-          <a:prstGeom prst="rect">
-            <a:avLst/>
-          </a:prstGeom>
-          <a:ln w="12700"/>
-        </p:spPr>
-        <p:style>
-          <a:lnRef idx="2">
-            <a:schemeClr val="dk1"/>
-          </a:lnRef>
-          <a:fillRef idx="1">
-            <a:schemeClr val="lt1"/>
-          </a:fillRef>
-          <a:effectRef idx="0">
-            <a:schemeClr val="dk1"/>
-          </a:effectRef>
-          <a:fontRef idx="minor">
-            <a:schemeClr val="dk1"/>
-          </a:fontRef>
-        </p:style>
-        <p:txBody>
-          <a:bodyPr rtlCol="0" anchor="ctr"/>
-          <a:lstStyle/>
-          <a:p>
-            <a:pPr algn="ctr"/>
-            <a:r>
-              <a:rPr lang="en-US" altLang="ja-JP" sz="1200"/>
-              <a:t>User Specified Area</a:t>
-            </a:r>
-          </a:p>
-          <a:p>
-            <a:pPr algn="ctr"/>
-            <a:endParaRPr lang="en-US" altLang="ja-JP" sz="1200"/>
-          </a:p>
-          <a:p>
-            <a:pPr algn="ctr"/>
-            <a:endParaRPr lang="en-US" altLang="ja-JP" sz="1200"/>
-          </a:p>
-          <a:p>
-            <a:pPr algn="ctr"/>
-            <a:endParaRPr lang="en-US" altLang="ja-JP" sz="1200"/>
-          </a:p>
-          <a:p>
-            <a:pPr algn="ctr"/>
-            <a:endParaRPr lang="en-US" altLang="ja-JP" sz="1200"/>
-          </a:p>
-          <a:p>
-            <a:pPr algn="ctr"/>
-            <a:endParaRPr lang="en-US" altLang="ja-JP" sz="1200"/>
-          </a:p>
-        </p:txBody>
-      </p:sp>
-      <p:sp>
-        <p:nvSpPr>
           <p:cNvPr id="79" name="タイトル 78"/>
           <p:cNvSpPr>
             <a:spLocks noGrp="1"/>
@@ -3467,10 +3405,10 @@
           <a:p>
             <a:pPr algn="ctr"/>
             <a:r>
-              <a:rPr kumimoji="1" lang="en-US" altLang="ja-JP"/>
+              <a:rPr kumimoji="1" lang="en-US" altLang="ja-JP" sz="2000"/>
               <a:t>Host Memory</a:t>
             </a:r>
-            <a:endParaRPr kumimoji="1" lang="ja-JP" altLang="en-US"/>
+            <a:endParaRPr kumimoji="1" lang="ja-JP" altLang="en-US" sz="2000"/>
           </a:p>
         </p:txBody>
       </p:sp>
@@ -3521,8 +3459,8 @@
         </p:nvSpPr>
         <p:spPr>
           <a:xfrm>
-            <a:off x="6119911" y="2895619"/>
-            <a:ext cx="1806743" cy="1036928"/>
+            <a:off x="5926217" y="2895619"/>
+            <a:ext cx="2000437" cy="1036928"/>
           </a:xfrm>
           <a:prstGeom prst="rect">
             <a:avLst/>
@@ -3549,49 +3487,10 @@
           <a:p>
             <a:pPr algn="ctr"/>
             <a:r>
-              <a:rPr kumimoji="1" lang="en-US" altLang="ja-JP" sz="1200"/>
+              <a:rPr kumimoji="1" lang="en-US" altLang="ja-JP" sz="1600"/>
               <a:t>I/O Register </a:t>
             </a:r>
-            <a:endParaRPr kumimoji="1" lang="ja-JP" altLang="en-US" sz="1200"/>
-          </a:p>
-        </p:txBody>
-      </p:sp>
-      <p:sp>
-        <p:nvSpPr>
-          <p:cNvPr id="14" name="正方形/長方形 13"/>
-          <p:cNvSpPr/>
-          <p:nvPr/>
-        </p:nvSpPr>
-        <p:spPr>
-          <a:xfrm>
-            <a:off x="6119909" y="5128032"/>
-            <a:ext cx="1806743" cy="783946"/>
-          </a:xfrm>
-          <a:prstGeom prst="rect">
-            <a:avLst/>
-          </a:prstGeom>
-          <a:ln w="12700"/>
-        </p:spPr>
-        <p:style>
-          <a:lnRef idx="2">
-            <a:schemeClr val="dk1"/>
-          </a:lnRef>
-          <a:fillRef idx="1">
-            <a:schemeClr val="lt1"/>
-          </a:fillRef>
-          <a:effectRef idx="0">
-            <a:schemeClr val="dk1"/>
-          </a:effectRef>
-          <a:fontRef idx="minor">
-            <a:schemeClr val="dk1"/>
-          </a:fontRef>
-        </p:style>
-        <p:txBody>
-          <a:bodyPr rtlCol="0" anchor="ctr"/>
-          <a:lstStyle/>
-          <a:p>
-            <a:pPr algn="ctr"/>
-            <a:endParaRPr lang="en-US" altLang="ja-JP" sz="1200"/>
+            <a:endParaRPr kumimoji="1" lang="ja-JP" altLang="en-US" sz="1600"/>
           </a:p>
         </p:txBody>
       </p:sp>
@@ -3640,7 +3539,7 @@
         <p:spPr>
           <a:xfrm flipH="1">
             <a:off x="5111242" y="3409873"/>
-            <a:ext cx="814974" cy="41628"/>
+            <a:ext cx="621276" cy="41628"/>
           </a:xfrm>
           <a:prstGeom prst="straightConnector1">
             <a:avLst/>
@@ -3677,8 +3576,8 @@
         </p:nvSpPr>
         <p:spPr>
           <a:xfrm>
-            <a:off x="6119911" y="2355704"/>
-            <a:ext cx="1806743" cy="536879"/>
+            <a:off x="5926217" y="2355704"/>
+            <a:ext cx="2000437" cy="536879"/>
           </a:xfrm>
           <a:prstGeom prst="rect">
             <a:avLst/>
@@ -3710,10 +3609,10 @@
           <a:p>
             <a:pPr algn="ctr"/>
             <a:r>
-              <a:rPr kumimoji="1" lang="en-US" altLang="ja-JP"/>
+              <a:rPr kumimoji="1" lang="en-US" altLang="ja-JP" sz="2000"/>
               <a:t>Device</a:t>
             </a:r>
-            <a:endParaRPr kumimoji="1" lang="ja-JP" altLang="en-US"/>
+            <a:endParaRPr kumimoji="1" lang="ja-JP" altLang="en-US" sz="2000"/>
           </a:p>
         </p:txBody>
       </p:sp>
@@ -3770,7 +3669,7 @@
         </p:nvSpPr>
         <p:spPr>
           <a:xfrm flipH="1">
-            <a:off x="5926216" y="2887198"/>
+            <a:off x="5732518" y="2887198"/>
             <a:ext cx="193695" cy="1045349"/>
           </a:xfrm>
           <a:prstGeom prst="rightBracket">
@@ -3815,7 +3714,7 @@
         </p:nvSpPr>
         <p:spPr>
           <a:xfrm>
-            <a:off x="5131461" y="3778658"/>
+            <a:off x="5169562" y="3945247"/>
             <a:ext cx="832855" cy="307777"/>
           </a:xfrm>
           <a:prstGeom prst="rect">
@@ -3845,8 +3744,8 @@
         </p:nvSpPr>
         <p:spPr>
           <a:xfrm>
-            <a:off x="2187673" y="2893545"/>
-            <a:ext cx="807721" cy="276999"/>
+            <a:off x="2035273" y="2893545"/>
+            <a:ext cx="1082348" cy="307777"/>
           </a:xfrm>
           <a:prstGeom prst="rect">
             <a:avLst/>
@@ -3860,10 +3759,10 @@
           <a:lstStyle/>
           <a:p>
             <a:r>
-              <a:rPr kumimoji="1" lang="en-US" altLang="ja-JP" sz="1200"/>
+              <a:rPr kumimoji="1" lang="en-US" altLang="ja-JP" sz="1400"/>
               <a:t>0x00000000</a:t>
             </a:r>
-            <a:endParaRPr kumimoji="1" lang="ja-JP" altLang="en-US" sz="1200"/>
+            <a:endParaRPr kumimoji="1" lang="ja-JP" altLang="en-US" sz="1400"/>
           </a:p>
         </p:txBody>
       </p:sp>
@@ -3875,8 +3774,8 @@
         </p:nvCxnSpPr>
         <p:spPr>
           <a:xfrm>
-            <a:off x="2283651" y="3157844"/>
-            <a:ext cx="807721" cy="0"/>
+            <a:off x="2131251" y="3157845"/>
+            <a:ext cx="965964" cy="1"/>
           </a:xfrm>
           <a:prstGeom prst="line">
             <a:avLst/>
@@ -3905,13 +3804,47 @@
       </p:cxnSp>
       <p:sp>
         <p:nvSpPr>
-          <p:cNvPr id="76" name="正方形/長方形 75"/>
+          <p:cNvPr id="78" name="テキスト ボックス 77"/>
+          <p:cNvSpPr txBox="1"/>
+          <p:nvPr/>
+        </p:nvSpPr>
+        <p:spPr>
+          <a:xfrm>
+            <a:off x="1876314" y="2648104"/>
+            <a:ext cx="1297476" cy="307777"/>
+          </a:xfrm>
+          <a:prstGeom prst="rect">
+            <a:avLst/>
+          </a:prstGeom>
+          <a:noFill/>
+        </p:spPr>
+        <p:txBody>
+          <a:bodyPr wrap="none" rtlCol="0">
+            <a:spAutoFit/>
+          </a:bodyPr>
+          <a:lstStyle/>
+          <a:p>
+            <a:r>
+              <a:rPr lang="en-US" altLang="ja-JP" sz="1400"/>
+              <a:t>V</a:t>
+            </a:r>
+            <a:r>
+              <a:rPr kumimoji="1" lang="en-US" altLang="ja-JP" sz="1400"/>
+              <a:t>irtual Address</a:t>
+            </a:r>
+            <a:endParaRPr kumimoji="1" lang="ja-JP" altLang="en-US" sz="1400"/>
+          </a:p>
+        </p:txBody>
+      </p:sp>
+      <p:sp>
+        <p:nvSpPr>
+          <p:cNvPr id="80" name="正方形/長方形 79"/>
           <p:cNvSpPr/>
           <p:nvPr/>
         </p:nvSpPr>
         <p:spPr>
           <a:xfrm>
-            <a:off x="6119911" y="4327618"/>
+            <a:off x="108608" y="2341333"/>
             <a:ext cx="1806743" cy="536879"/>
           </a:xfrm>
           <a:prstGeom prst="rect">
@@ -3944,23 +3877,23 @@
           <a:p>
             <a:pPr algn="ctr"/>
             <a:r>
-              <a:rPr kumimoji="1" lang="en-US" altLang="ja-JP"/>
-              <a:t>Device Memory</a:t>
-            </a:r>
-            <a:endParaRPr kumimoji="1" lang="ja-JP" altLang="en-US"/>
-          </a:p>
-        </p:txBody>
-      </p:sp>
-      <p:sp>
-        <p:nvSpPr>
-          <p:cNvPr id="78" name="テキスト ボックス 77"/>
+              <a:rPr lang="en-US" altLang="ja-JP" sz="2000"/>
+              <a:t>CPU</a:t>
+            </a:r>
+            <a:endParaRPr kumimoji="1" lang="en-US" altLang="ja-JP" sz="2000"/>
+          </a:p>
+        </p:txBody>
+      </p:sp>
+      <p:sp>
+        <p:nvSpPr>
+          <p:cNvPr id="82" name="テキスト ボックス 81"/>
           <p:cNvSpPr txBox="1"/>
           <p:nvPr/>
         </p:nvSpPr>
         <p:spPr>
           <a:xfrm>
-            <a:off x="2028714" y="2673504"/>
-            <a:ext cx="971409" cy="276999"/>
+            <a:off x="1062780" y="3860913"/>
+            <a:ext cx="1155485" cy="338554"/>
           </a:xfrm>
           <a:prstGeom prst="rect">
             <a:avLst/>
@@ -3974,92 +3907,10 @@
           <a:lstStyle/>
           <a:p>
             <a:r>
-              <a:rPr lang="en-US" altLang="ja-JP" sz="1200"/>
-              <a:t>V</a:t>
-            </a:r>
-            <a:r>
-              <a:rPr kumimoji="1" lang="en-US" altLang="ja-JP" sz="1200"/>
-              <a:t>irtual Address</a:t>
-            </a:r>
-            <a:endParaRPr kumimoji="1" lang="ja-JP" altLang="en-US" sz="1200"/>
-          </a:p>
-        </p:txBody>
-      </p:sp>
-      <p:sp>
-        <p:nvSpPr>
-          <p:cNvPr id="80" name="正方形/長方形 79"/>
-          <p:cNvSpPr/>
-          <p:nvPr/>
-        </p:nvSpPr>
-        <p:spPr>
-          <a:xfrm>
-            <a:off x="159408" y="2341333"/>
-            <a:ext cx="1806743" cy="536879"/>
-          </a:xfrm>
-          <a:prstGeom prst="rect">
-            <a:avLst/>
-          </a:prstGeom>
-          <a:solidFill>
-            <a:schemeClr val="bg1">
-              <a:lumMod val="85000"/>
-            </a:schemeClr>
-          </a:solidFill>
-          <a:ln w="12700"/>
-        </p:spPr>
-        <p:style>
-          <a:lnRef idx="2">
-            <a:schemeClr val="dk1"/>
-          </a:lnRef>
-          <a:fillRef idx="1">
-            <a:schemeClr val="lt1"/>
-          </a:fillRef>
-          <a:effectRef idx="0">
-            <a:schemeClr val="dk1"/>
-          </a:effectRef>
-          <a:fontRef idx="minor">
-            <a:schemeClr val="dk1"/>
-          </a:fontRef>
-        </p:style>
-        <p:txBody>
-          <a:bodyPr rtlCol="0" anchor="ctr"/>
-          <a:lstStyle/>
-          <a:p>
-            <a:pPr algn="ctr"/>
-            <a:r>
-              <a:rPr lang="en-US" altLang="ja-JP"/>
-              <a:t>CPU</a:t>
-            </a:r>
-            <a:endParaRPr kumimoji="1" lang="en-US" altLang="ja-JP"/>
-          </a:p>
-        </p:txBody>
-      </p:sp>
-      <p:sp>
-        <p:nvSpPr>
-          <p:cNvPr id="82" name="テキスト ボックス 81"/>
-          <p:cNvSpPr txBox="1"/>
-          <p:nvPr/>
-        </p:nvSpPr>
-        <p:spPr>
-          <a:xfrm>
-            <a:off x="1062780" y="3645013"/>
-            <a:ext cx="852104" cy="261610"/>
-          </a:xfrm>
-          <a:prstGeom prst="rect">
-            <a:avLst/>
-          </a:prstGeom>
-          <a:noFill/>
-        </p:spPr>
-        <p:txBody>
-          <a:bodyPr wrap="none" rtlCol="0">
-            <a:spAutoFit/>
-          </a:bodyPr>
-          <a:lstStyle/>
-          <a:p>
-            <a:r>
-              <a:rPr kumimoji="1" lang="en-US" altLang="ja-JP" sz="1100"/>
+              <a:rPr kumimoji="1" lang="en-US" altLang="ja-JP" sz="1600"/>
               <a:t>Read/Write</a:t>
             </a:r>
-            <a:endParaRPr kumimoji="1" lang="ja-JP" altLang="en-US" sz="1100"/>
+            <a:endParaRPr kumimoji="1" lang="ja-JP" altLang="en-US" sz="1600"/>
           </a:p>
         </p:txBody>
       </p:sp>
@@ -4073,122 +3924,10 @@
         </p:nvCxnSpPr>
         <p:spPr>
           <a:xfrm rot="16200000" flipH="1">
-            <a:off x="1565792" y="2375200"/>
-            <a:ext cx="1028411" cy="2034434"/>
+            <a:off x="1549477" y="2340714"/>
+            <a:ext cx="1021868" cy="2096863"/>
           </a:xfrm>
           <a:prstGeom prst="bentConnector2">
-            <a:avLst/>
-          </a:prstGeom>
-          <a:ln w="19050">
-            <a:solidFill>
-              <a:schemeClr val="tx1"/>
-            </a:solidFill>
-            <a:headEnd type="arrow"/>
-            <a:tailEnd type="arrow"/>
-          </a:ln>
-          <a:effectLst/>
-        </p:spPr>
-        <p:style>
-          <a:lnRef idx="2">
-            <a:schemeClr val="accent1"/>
-          </a:lnRef>
-          <a:fillRef idx="0">
-            <a:schemeClr val="accent1"/>
-          </a:fillRef>
-          <a:effectRef idx="1">
-            <a:schemeClr val="accent1"/>
-          </a:effectRef>
-          <a:fontRef idx="minor">
-            <a:schemeClr val="tx1"/>
-          </a:fontRef>
-        </p:style>
-      </p:cxnSp>
-      <p:sp>
-        <p:nvSpPr>
-          <p:cNvPr id="27" name="正方形/長方形 26"/>
-          <p:cNvSpPr/>
-          <p:nvPr/>
-        </p:nvSpPr>
-        <p:spPr>
-          <a:xfrm>
-            <a:off x="6119912" y="4859592"/>
-            <a:ext cx="1806743" cy="268439"/>
-          </a:xfrm>
-          <a:prstGeom prst="rect">
-            <a:avLst/>
-          </a:prstGeom>
-          <a:ln w="12700"/>
-        </p:spPr>
-        <p:style>
-          <a:lnRef idx="2">
-            <a:schemeClr val="dk1"/>
-          </a:lnRef>
-          <a:fillRef idx="1">
-            <a:schemeClr val="lt1"/>
-          </a:fillRef>
-          <a:effectRef idx="0">
-            <a:schemeClr val="dk1"/>
-          </a:effectRef>
-          <a:fontRef idx="minor">
-            <a:schemeClr val="dk1"/>
-          </a:fontRef>
-        </p:style>
-        <p:txBody>
-          <a:bodyPr rtlCol="0" anchor="ctr"/>
-          <a:lstStyle/>
-          <a:p>
-            <a:pPr algn="ctr"/>
-            <a:endParaRPr lang="en-US" altLang="ja-JP" sz="1200"/>
-          </a:p>
-        </p:txBody>
-      </p:sp>
-      <p:cxnSp>
-        <p:nvCxnSpPr>
-          <p:cNvPr id="29" name="直線コネクタ 28"/>
-          <p:cNvCxnSpPr/>
-          <p:nvPr/>
-        </p:nvCxnSpPr>
-        <p:spPr>
-          <a:xfrm flipH="1">
-            <a:off x="6119913" y="4975632"/>
-            <a:ext cx="1806742" cy="0"/>
-          </a:xfrm>
-          <a:prstGeom prst="line">
-            <a:avLst/>
-          </a:prstGeom>
-          <a:ln>
-            <a:prstDash val="sysDash"/>
-          </a:ln>
-        </p:spPr>
-        <p:style>
-          <a:lnRef idx="1">
-            <a:schemeClr val="dk1"/>
-          </a:lnRef>
-          <a:fillRef idx="0">
-            <a:schemeClr val="dk1"/>
-          </a:fillRef>
-          <a:effectRef idx="0">
-            <a:schemeClr val="dk1"/>
-          </a:effectRef>
-          <a:fontRef idx="minor">
-            <a:schemeClr val="tx1"/>
-          </a:fontRef>
-        </p:style>
-      </p:cxnSp>
-      <p:cxnSp>
-        <p:nvCxnSpPr>
-          <p:cNvPr id="31" name="直線矢印コネクタ 30"/>
-          <p:cNvCxnSpPr>
-            <a:stCxn id="40" idx="2"/>
-          </p:cNvCxnSpPr>
-          <p:nvPr/>
-        </p:nvCxnSpPr>
-        <p:spPr>
-          <a:xfrm flipH="1" flipV="1">
-            <a:off x="5131461" y="4051301"/>
-            <a:ext cx="794752" cy="1275632"/>
-          </a:xfrm>
-          <a:prstGeom prst="straightConnector1">
             <a:avLst/>
           </a:prstGeom>
           <a:ln w="19050">
@@ -4217,85 +3956,26 @@
       </p:cxnSp>
       <p:cxnSp>
         <p:nvCxnSpPr>
-          <p:cNvPr id="37" name="直線コネクタ 36"/>
-          <p:cNvCxnSpPr/>
+          <p:cNvPr id="31" name="直線矢印コネクタ 30"/>
+          <p:cNvCxnSpPr>
+            <a:stCxn id="40" idx="2"/>
+          </p:cNvCxnSpPr>
           <p:nvPr/>
         </p:nvCxnSpPr>
         <p:spPr>
-          <a:xfrm flipH="1">
-            <a:off x="6119913" y="6156732"/>
-            <a:ext cx="1806742" cy="0"/>
-          </a:xfrm>
-          <a:prstGeom prst="line">
+          <a:xfrm flipH="1" flipV="1">
+            <a:off x="5131462" y="4051302"/>
+            <a:ext cx="634468" cy="1275633"/>
+          </a:xfrm>
+          <a:prstGeom prst="straightConnector1">
             <a:avLst/>
           </a:prstGeom>
-          <a:ln>
-            <a:prstDash val="sysDash"/>
-          </a:ln>
-        </p:spPr>
-        <p:style>
-          <a:lnRef idx="1">
-            <a:schemeClr val="dk1"/>
-          </a:lnRef>
-          <a:fillRef idx="0">
-            <a:schemeClr val="dk1"/>
-          </a:fillRef>
-          <a:effectRef idx="0">
-            <a:schemeClr val="dk1"/>
-          </a:effectRef>
-          <a:fontRef idx="minor">
-            <a:schemeClr val="tx1"/>
-          </a:fontRef>
-        </p:style>
-      </p:cxnSp>
-      <p:sp>
-        <p:nvSpPr>
-          <p:cNvPr id="34" name="テキスト ボックス 33"/>
-          <p:cNvSpPr txBox="1"/>
-          <p:nvPr/>
-        </p:nvSpPr>
-        <p:spPr>
-          <a:xfrm>
-            <a:off x="2178893" y="3468159"/>
-            <a:ext cx="807721" cy="276999"/>
-          </a:xfrm>
-          <a:prstGeom prst="rect">
-            <a:avLst/>
-          </a:prstGeom>
-          <a:noFill/>
-        </p:spPr>
-        <p:txBody>
-          <a:bodyPr wrap="none" rtlCol="0">
-            <a:spAutoFit/>
-          </a:bodyPr>
-          <a:lstStyle/>
-          <a:p>
-            <a:r>
-              <a:rPr kumimoji="1" lang="en-US" altLang="ja-JP" sz="1200"/>
-              <a:t>0x70000000</a:t>
-            </a:r>
-            <a:endParaRPr kumimoji="1" lang="ja-JP" altLang="en-US" sz="1200"/>
-          </a:p>
-        </p:txBody>
-      </p:sp>
-      <p:cxnSp>
-        <p:nvCxnSpPr>
-          <p:cNvPr id="38" name="直線コネクタ 37"/>
-          <p:cNvCxnSpPr/>
-          <p:nvPr/>
-        </p:nvCxnSpPr>
-        <p:spPr>
-          <a:xfrm>
-            <a:off x="2280493" y="3745158"/>
-            <a:ext cx="807721" cy="0"/>
-          </a:xfrm>
-          <a:prstGeom prst="line">
-            <a:avLst/>
-          </a:prstGeom>
-          <a:ln w="12700">
+          <a:ln w="19050">
             <a:solidFill>
               <a:schemeClr val="tx1"/>
             </a:solidFill>
+            <a:headEnd type="arrow"/>
+            <a:tailEnd type="arrow"/>
           </a:ln>
           <a:effectLst/>
         </p:spPr>
@@ -4316,25 +3996,56 @@
       </p:cxnSp>
       <p:sp>
         <p:nvSpPr>
-          <p:cNvPr id="40" name="右大かっこ 39"/>
-          <p:cNvSpPr/>
-          <p:nvPr/>
-        </p:nvSpPr>
-        <p:spPr>
-          <a:xfrm flipH="1">
-            <a:off x="5926213" y="5128030"/>
-            <a:ext cx="193696" cy="397805"/>
-          </a:xfrm>
-          <a:prstGeom prst="rightBracket">
-            <a:avLst>
-              <a:gd name="adj" fmla="val 29762"/>
-            </a:avLst>
-          </a:prstGeom>
-          <a:ln>
+          <p:cNvPr id="34" name="テキスト ボックス 33"/>
+          <p:cNvSpPr txBox="1"/>
+          <p:nvPr/>
+        </p:nvSpPr>
+        <p:spPr>
+          <a:xfrm>
+            <a:off x="2064593" y="3468159"/>
+            <a:ext cx="1082348" cy="307777"/>
+          </a:xfrm>
+          <a:prstGeom prst="rect">
+            <a:avLst/>
+          </a:prstGeom>
+          <a:noFill/>
+        </p:spPr>
+        <p:txBody>
+          <a:bodyPr wrap="none" rtlCol="0">
+            <a:spAutoFit/>
+          </a:bodyPr>
+          <a:lstStyle/>
+          <a:p>
+            <a:r>
+              <a:rPr kumimoji="1" lang="en-US" altLang="ja-JP" sz="1400"/>
+              <a:t>0x70000000</a:t>
+            </a:r>
+            <a:endParaRPr kumimoji="1" lang="ja-JP" altLang="en-US" sz="1400"/>
+          </a:p>
+        </p:txBody>
+      </p:sp>
+      <p:cxnSp>
+        <p:nvCxnSpPr>
+          <p:cNvPr id="38" name="直線コネクタ 37"/>
+          <p:cNvCxnSpPr>
+            <a:endCxn id="24" idx="1"/>
+          </p:cNvCxnSpPr>
+          <p:nvPr/>
+        </p:nvCxnSpPr>
+        <p:spPr>
+          <a:xfrm>
+            <a:off x="2131251" y="3742732"/>
+            <a:ext cx="960120" cy="0"/>
+          </a:xfrm>
+          <a:prstGeom prst="line">
+            <a:avLst/>
+          </a:prstGeom>
+          <a:ln w="12700">
             <a:solidFill>
               <a:schemeClr val="tx1"/>
             </a:solidFill>
           </a:ln>
+          <a:effectLst/>
         </p:spPr>
         <p:style>
           <a:lnRef idx="2">
@@ -4350,160 +4061,17 @@
             <a:schemeClr val="tx1"/>
           </a:fontRef>
         </p:style>
-        <p:txBody>
-          <a:bodyPr rtlCol="0" anchor="ctr"/>
-          <a:lstStyle/>
-          <a:p>
-            <a:pPr algn="ctr"/>
-            <a:endParaRPr kumimoji="1" lang="ja-JP" altLang="en-US"/>
-          </a:p>
-        </p:txBody>
-      </p:sp>
-      <p:sp>
-        <p:nvSpPr>
-          <p:cNvPr id="24" name="正方形/長方形 23"/>
+      </p:cxnSp>
+      <p:sp>
+        <p:nvSpPr>
+          <p:cNvPr id="40" name="右大かっこ 39"/>
           <p:cNvSpPr/>
           <p:nvPr/>
         </p:nvSpPr>
         <p:spPr>
-          <a:xfrm>
-            <a:off x="3091371" y="3157845"/>
-            <a:ext cx="1806743" cy="1169774"/>
-          </a:xfrm>
-          <a:prstGeom prst="rect">
-            <a:avLst/>
-          </a:prstGeom>
-          <a:noFill/>
-          <a:ln w="12700"/>
-        </p:spPr>
-        <p:style>
-          <a:lnRef idx="2">
-            <a:schemeClr val="dk1"/>
-          </a:lnRef>
-          <a:fillRef idx="1">
-            <a:schemeClr val="lt1"/>
-          </a:fillRef>
-          <a:effectRef idx="0">
-            <a:schemeClr val="dk1"/>
-          </a:effectRef>
-          <a:fontRef idx="minor">
-            <a:schemeClr val="dk1"/>
-          </a:fontRef>
-        </p:style>
-        <p:txBody>
-          <a:bodyPr rtlCol="0" anchor="ctr"/>
-          <a:lstStyle/>
-          <a:p>
-            <a:pPr algn="ctr"/>
-            <a:endParaRPr kumimoji="1" lang="en-US" altLang="ja-JP" sz="1200"/>
-          </a:p>
-          <a:p>
-            <a:pPr algn="ctr"/>
-            <a:r>
-              <a:rPr kumimoji="1" lang="en-US" altLang="ja-JP" sz="1200"/>
-              <a:t>BAR0</a:t>
-            </a:r>
-          </a:p>
-          <a:p>
-            <a:pPr algn="ctr"/>
-            <a:endParaRPr lang="en-US" altLang="ja-JP" sz="1200"/>
-          </a:p>
-          <a:p>
-            <a:pPr algn="ctr"/>
-            <a:endParaRPr kumimoji="1" lang="en-US" altLang="ja-JP" sz="1200"/>
-          </a:p>
-          <a:p>
-            <a:pPr algn="ctr"/>
-            <a:endParaRPr kumimoji="1" lang="ja-JP" altLang="en-US" sz="1200"/>
-          </a:p>
-        </p:txBody>
-      </p:sp>
-      <p:sp>
-        <p:nvSpPr>
-          <p:cNvPr id="42" name="正方形/長方形 41"/>
-          <p:cNvSpPr/>
-          <p:nvPr/>
-        </p:nvSpPr>
-        <p:spPr>
-          <a:xfrm>
-            <a:off x="3097215" y="4327618"/>
-            <a:ext cx="1806743" cy="1169774"/>
-          </a:xfrm>
-          <a:prstGeom prst="rect">
-            <a:avLst/>
-          </a:prstGeom>
-          <a:noFill/>
-          <a:ln w="12700"/>
-        </p:spPr>
-        <p:style>
-          <a:lnRef idx="2">
-            <a:schemeClr val="dk1"/>
-          </a:lnRef>
-          <a:fillRef idx="1">
-            <a:schemeClr val="lt1"/>
-          </a:fillRef>
-          <a:effectRef idx="0">
-            <a:schemeClr val="dk1"/>
-          </a:effectRef>
-          <a:fontRef idx="minor">
-            <a:schemeClr val="dk1"/>
-          </a:fontRef>
-        </p:style>
-        <p:txBody>
-          <a:bodyPr rtlCol="0" anchor="ctr"/>
-          <a:lstStyle/>
-          <a:p>
-            <a:pPr algn="ctr"/>
-            <a:r>
-              <a:rPr kumimoji="1" lang="en-US" altLang="ja-JP" sz="1200"/>
-              <a:t>BAR1</a:t>
-            </a:r>
-          </a:p>
-        </p:txBody>
-      </p:sp>
-      <p:cxnSp>
-        <p:nvCxnSpPr>
-          <p:cNvPr id="43" name="直線コネクタ 42"/>
-          <p:cNvCxnSpPr/>
-          <p:nvPr/>
-        </p:nvCxnSpPr>
-        <p:spPr>
           <a:xfrm flipH="1">
-            <a:off x="3134744" y="3745158"/>
-            <a:ext cx="1806742" cy="0"/>
-          </a:xfrm>
-          <a:prstGeom prst="line">
-            <a:avLst/>
-          </a:prstGeom>
-          <a:ln>
-            <a:prstDash val="sysDash"/>
-          </a:ln>
-        </p:spPr>
-        <p:style>
-          <a:lnRef idx="1">
-            <a:schemeClr val="dk1"/>
-          </a:lnRef>
-          <a:fillRef idx="0">
-            <a:schemeClr val="dk1"/>
-          </a:fillRef>
-          <a:effectRef idx="0">
-            <a:schemeClr val="dk1"/>
-          </a:effectRef>
-          <a:fontRef idx="minor">
-            <a:schemeClr val="tx1"/>
-          </a:fontRef>
-        </p:style>
-      </p:cxnSp>
-      <p:sp>
-        <p:nvSpPr>
-          <p:cNvPr id="46" name="右大かっこ 45"/>
-          <p:cNvSpPr/>
-          <p:nvPr/>
-        </p:nvSpPr>
-        <p:spPr>
-          <a:xfrm>
-            <a:off x="4895694" y="3757643"/>
-            <a:ext cx="215216" cy="569975"/>
+            <a:off x="5765930" y="5128032"/>
+            <a:ext cx="193696" cy="397805"/>
           </a:xfrm>
           <a:prstGeom prst="rightBracket">
             <a:avLst>
@@ -4539,15 +4107,98 @@
           </a:p>
         </p:txBody>
       </p:sp>
+      <p:sp>
+        <p:nvSpPr>
+          <p:cNvPr id="24" name="正方形/長方形 23"/>
+          <p:cNvSpPr/>
+          <p:nvPr/>
+        </p:nvSpPr>
+        <p:spPr>
+          <a:xfrm>
+            <a:off x="3091371" y="3157845"/>
+            <a:ext cx="1806743" cy="1169774"/>
+          </a:xfrm>
+          <a:prstGeom prst="rect">
+            <a:avLst/>
+          </a:prstGeom>
+          <a:noFill/>
+          <a:ln w="12700"/>
+        </p:spPr>
+        <p:style>
+          <a:lnRef idx="2">
+            <a:schemeClr val="dk1"/>
+          </a:lnRef>
+          <a:fillRef idx="1">
+            <a:schemeClr val="lt1"/>
+          </a:fillRef>
+          <a:effectRef idx="0">
+            <a:schemeClr val="dk1"/>
+          </a:effectRef>
+          <a:fontRef idx="minor">
+            <a:schemeClr val="dk1"/>
+          </a:fontRef>
+        </p:style>
+        <p:txBody>
+          <a:bodyPr rtlCol="0" anchor="ctr"/>
+          <a:lstStyle/>
+          <a:p>
+            <a:pPr algn="ctr"/>
+            <a:endParaRPr kumimoji="1" lang="ja-JP" altLang="en-US" sz="1200"/>
+          </a:p>
+        </p:txBody>
+      </p:sp>
+      <p:sp>
+        <p:nvSpPr>
+          <p:cNvPr id="42" name="正方形/長方形 41"/>
+          <p:cNvSpPr/>
+          <p:nvPr/>
+        </p:nvSpPr>
+        <p:spPr>
+          <a:xfrm>
+            <a:off x="3097215" y="4327618"/>
+            <a:ext cx="1806743" cy="1169774"/>
+          </a:xfrm>
+          <a:prstGeom prst="rect">
+            <a:avLst/>
+          </a:prstGeom>
+          <a:noFill/>
+          <a:ln w="12700"/>
+        </p:spPr>
+        <p:style>
+          <a:lnRef idx="2">
+            <a:schemeClr val="dk1"/>
+          </a:lnRef>
+          <a:fillRef idx="1">
+            <a:schemeClr val="lt1"/>
+          </a:fillRef>
+          <a:effectRef idx="0">
+            <a:schemeClr val="dk1"/>
+          </a:effectRef>
+          <a:fontRef idx="minor">
+            <a:schemeClr val="dk1"/>
+          </a:fontRef>
+        </p:style>
+        <p:txBody>
+          <a:bodyPr rtlCol="0" anchor="ctr"/>
+          <a:lstStyle/>
+          <a:p>
+            <a:pPr algn="ctr"/>
+            <a:r>
+              <a:rPr kumimoji="1" lang="en-US" altLang="ja-JP" sz="1600"/>
+              <a:t>PCI BAR1</a:t>
+            </a:r>
+          </a:p>
+        </p:txBody>
+      </p:sp>
       <p:cxnSp>
         <p:nvCxnSpPr>
-          <p:cNvPr id="51" name="直線コネクタ 50"/>
+          <p:cNvPr id="43" name="直線コネクタ 42"/>
           <p:cNvCxnSpPr/>
           <p:nvPr/>
         </p:nvCxnSpPr>
         <p:spPr>
           <a:xfrm flipH="1">
-            <a:off x="6119913" y="5525836"/>
+            <a:off x="3134744" y="3745158"/>
             <a:ext cx="1806742" cy="0"/>
           </a:xfrm>
           <a:prstGeom prst="line">
@@ -4574,14 +4225,406 @@
       </p:cxnSp>
       <p:sp>
         <p:nvSpPr>
-          <p:cNvPr id="22" name="正方形/長方形 21"/>
+          <p:cNvPr id="46" name="右大かっこ 45"/>
           <p:cNvSpPr/>
           <p:nvPr/>
         </p:nvSpPr>
         <p:spPr>
           <a:xfrm>
-            <a:off x="6464300" y="5326933"/>
-            <a:ext cx="1168400" cy="338138"/>
+            <a:off x="4895694" y="3757643"/>
+            <a:ext cx="215216" cy="569975"/>
+          </a:xfrm>
+          <a:prstGeom prst="rightBracket">
+            <a:avLst>
+              <a:gd name="adj" fmla="val 29762"/>
+            </a:avLst>
+          </a:prstGeom>
+          <a:ln>
+            <a:solidFill>
+              <a:schemeClr val="tx1"/>
+            </a:solidFill>
+          </a:ln>
+        </p:spPr>
+        <p:style>
+          <a:lnRef idx="2">
+            <a:schemeClr val="accent1"/>
+          </a:lnRef>
+          <a:fillRef idx="0">
+            <a:schemeClr val="accent1"/>
+          </a:fillRef>
+          <a:effectRef idx="1">
+            <a:schemeClr val="accent1"/>
+          </a:effectRef>
+          <a:fontRef idx="minor">
+            <a:schemeClr val="tx1"/>
+          </a:fontRef>
+        </p:style>
+        <p:txBody>
+          <a:bodyPr rtlCol="0" anchor="ctr"/>
+          <a:lstStyle/>
+          <a:p>
+            <a:pPr algn="ctr"/>
+            <a:endParaRPr kumimoji="1" lang="ja-JP" altLang="en-US"/>
+          </a:p>
+        </p:txBody>
+      </p:sp>
+      <p:grpSp>
+        <p:nvGrpSpPr>
+          <p:cNvPr id="12" name="図形グループ 11"/>
+          <p:cNvGrpSpPr/>
+          <p:nvPr/>
+        </p:nvGrpSpPr>
+        <p:grpSpPr>
+          <a:xfrm>
+            <a:off x="5926213" y="4327618"/>
+            <a:ext cx="2000442" cy="2069529"/>
+            <a:chOff x="6119909" y="4327618"/>
+            <a:chExt cx="1806746" cy="2069529"/>
+          </a:xfrm>
+        </p:grpSpPr>
+        <p:sp>
+          <p:nvSpPr>
+            <p:cNvPr id="35" name="正方形/長方形 34"/>
+            <p:cNvSpPr/>
+            <p:nvPr/>
+          </p:nvSpPr>
+          <p:spPr>
+            <a:xfrm>
+              <a:off x="6119910" y="5119786"/>
+              <a:ext cx="1806743" cy="1277361"/>
+            </a:xfrm>
+            <a:prstGeom prst="rect">
+              <a:avLst/>
+            </a:prstGeom>
+            <a:ln w="12700"/>
+          </p:spPr>
+          <p:style>
+            <a:lnRef idx="2">
+              <a:schemeClr val="dk1"/>
+            </a:lnRef>
+            <a:fillRef idx="1">
+              <a:schemeClr val="lt1"/>
+            </a:fillRef>
+            <a:effectRef idx="0">
+              <a:schemeClr val="dk1"/>
+            </a:effectRef>
+            <a:fontRef idx="minor">
+              <a:schemeClr val="dk1"/>
+            </a:fontRef>
+          </p:style>
+          <p:txBody>
+            <a:bodyPr rtlCol="0" anchor="ctr"/>
+            <a:lstStyle/>
+            <a:p>
+              <a:pPr algn="ctr"/>
+              <a:r>
+                <a:rPr lang="en-US" altLang="ja-JP" sz="1200"/>
+                <a:t>User Specified Area</a:t>
+              </a:r>
+            </a:p>
+            <a:p>
+              <a:pPr algn="ctr"/>
+              <a:endParaRPr lang="en-US" altLang="ja-JP" sz="1200"/>
+            </a:p>
+            <a:p>
+              <a:pPr algn="ctr"/>
+              <a:endParaRPr lang="en-US" altLang="ja-JP" sz="1200"/>
+            </a:p>
+            <a:p>
+              <a:pPr algn="ctr"/>
+              <a:endParaRPr lang="en-US" altLang="ja-JP" sz="1200"/>
+            </a:p>
+            <a:p>
+              <a:pPr algn="ctr"/>
+              <a:endParaRPr lang="en-US" altLang="ja-JP" sz="1200"/>
+            </a:p>
+            <a:p>
+              <a:pPr algn="ctr"/>
+              <a:endParaRPr lang="en-US" altLang="ja-JP" sz="1200"/>
+            </a:p>
+          </p:txBody>
+        </p:sp>
+        <p:sp>
+          <p:nvSpPr>
+            <p:cNvPr id="14" name="正方形/長方形 13"/>
+            <p:cNvSpPr/>
+            <p:nvPr/>
+          </p:nvSpPr>
+          <p:spPr>
+            <a:xfrm>
+              <a:off x="6119909" y="5128032"/>
+              <a:ext cx="1806743" cy="783946"/>
+            </a:xfrm>
+            <a:prstGeom prst="rect">
+              <a:avLst/>
+            </a:prstGeom>
+            <a:ln w="12700"/>
+          </p:spPr>
+          <p:style>
+            <a:lnRef idx="2">
+              <a:schemeClr val="dk1"/>
+            </a:lnRef>
+            <a:fillRef idx="1">
+              <a:schemeClr val="lt1"/>
+            </a:fillRef>
+            <a:effectRef idx="0">
+              <a:schemeClr val="dk1"/>
+            </a:effectRef>
+            <a:fontRef idx="minor">
+              <a:schemeClr val="dk1"/>
+            </a:fontRef>
+          </p:style>
+          <p:txBody>
+            <a:bodyPr rtlCol="0" anchor="ctr"/>
+            <a:lstStyle/>
+            <a:p>
+              <a:pPr algn="ctr"/>
+              <a:endParaRPr lang="en-US" altLang="ja-JP" sz="1200"/>
+            </a:p>
+          </p:txBody>
+        </p:sp>
+        <p:sp>
+          <p:nvSpPr>
+            <p:cNvPr id="76" name="正方形/長方形 75"/>
+            <p:cNvSpPr/>
+            <p:nvPr/>
+          </p:nvSpPr>
+          <p:spPr>
+            <a:xfrm>
+              <a:off x="6119911" y="4327618"/>
+              <a:ext cx="1806743" cy="536879"/>
+            </a:xfrm>
+            <a:prstGeom prst="rect">
+              <a:avLst/>
+            </a:prstGeom>
+            <a:solidFill>
+              <a:schemeClr val="bg1">
+                <a:lumMod val="85000"/>
+              </a:schemeClr>
+            </a:solidFill>
+            <a:ln w="12700"/>
+          </p:spPr>
+          <p:style>
+            <a:lnRef idx="2">
+              <a:schemeClr val="dk1"/>
+            </a:lnRef>
+            <a:fillRef idx="1">
+              <a:schemeClr val="lt1"/>
+            </a:fillRef>
+            <a:effectRef idx="0">
+              <a:schemeClr val="dk1"/>
+            </a:effectRef>
+            <a:fontRef idx="minor">
+              <a:schemeClr val="dk1"/>
+            </a:fontRef>
+          </p:style>
+          <p:txBody>
+            <a:bodyPr rtlCol="0" anchor="ctr"/>
+            <a:lstStyle/>
+            <a:p>
+              <a:pPr algn="ctr"/>
+              <a:r>
+                <a:rPr kumimoji="1" lang="en-US" altLang="ja-JP" sz="2000"/>
+                <a:t>DeviceMemory</a:t>
+              </a:r>
+              <a:endParaRPr kumimoji="1" lang="ja-JP" altLang="en-US" sz="2000"/>
+            </a:p>
+          </p:txBody>
+        </p:sp>
+        <p:sp>
+          <p:nvSpPr>
+            <p:cNvPr id="27" name="正方形/長方形 26"/>
+            <p:cNvSpPr/>
+            <p:nvPr/>
+          </p:nvSpPr>
+          <p:spPr>
+            <a:xfrm>
+              <a:off x="6119912" y="4859592"/>
+              <a:ext cx="1806743" cy="268439"/>
+            </a:xfrm>
+            <a:prstGeom prst="rect">
+              <a:avLst/>
+            </a:prstGeom>
+            <a:ln w="12700"/>
+          </p:spPr>
+          <p:style>
+            <a:lnRef idx="2">
+              <a:schemeClr val="dk1"/>
+            </a:lnRef>
+            <a:fillRef idx="1">
+              <a:schemeClr val="lt1"/>
+            </a:fillRef>
+            <a:effectRef idx="0">
+              <a:schemeClr val="dk1"/>
+            </a:effectRef>
+            <a:fontRef idx="minor">
+              <a:schemeClr val="dk1"/>
+            </a:fontRef>
+          </p:style>
+          <p:txBody>
+            <a:bodyPr rtlCol="0" anchor="ctr"/>
+            <a:lstStyle/>
+            <a:p>
+              <a:pPr algn="ctr"/>
+              <a:endParaRPr lang="en-US" altLang="ja-JP" sz="1200"/>
+            </a:p>
+          </p:txBody>
+        </p:sp>
+        <p:cxnSp>
+          <p:nvCxnSpPr>
+            <p:cNvPr id="29" name="直線コネクタ 28"/>
+            <p:cNvCxnSpPr/>
+            <p:nvPr/>
+          </p:nvCxnSpPr>
+          <p:spPr>
+            <a:xfrm flipH="1">
+              <a:off x="6119913" y="4975632"/>
+              <a:ext cx="1806742" cy="0"/>
+            </a:xfrm>
+            <a:prstGeom prst="line">
+              <a:avLst/>
+            </a:prstGeom>
+            <a:ln>
+              <a:prstDash val="sysDash"/>
+            </a:ln>
+          </p:spPr>
+          <p:style>
+            <a:lnRef idx="1">
+              <a:schemeClr val="dk1"/>
+            </a:lnRef>
+            <a:fillRef idx="0">
+              <a:schemeClr val="dk1"/>
+            </a:fillRef>
+            <a:effectRef idx="0">
+              <a:schemeClr val="dk1"/>
+            </a:effectRef>
+            <a:fontRef idx="minor">
+              <a:schemeClr val="tx1"/>
+            </a:fontRef>
+          </p:style>
+        </p:cxnSp>
+        <p:cxnSp>
+          <p:nvCxnSpPr>
+            <p:cNvPr id="37" name="直線コネクタ 36"/>
+            <p:cNvCxnSpPr/>
+            <p:nvPr/>
+          </p:nvCxnSpPr>
+          <p:spPr>
+            <a:xfrm flipH="1">
+              <a:off x="6119913" y="6156732"/>
+              <a:ext cx="1806742" cy="0"/>
+            </a:xfrm>
+            <a:prstGeom prst="line">
+              <a:avLst/>
+            </a:prstGeom>
+            <a:ln>
+              <a:prstDash val="sysDash"/>
+            </a:ln>
+          </p:spPr>
+          <p:style>
+            <a:lnRef idx="1">
+              <a:schemeClr val="dk1"/>
+            </a:lnRef>
+            <a:fillRef idx="0">
+              <a:schemeClr val="dk1"/>
+            </a:fillRef>
+            <a:effectRef idx="0">
+              <a:schemeClr val="dk1"/>
+            </a:effectRef>
+            <a:fontRef idx="minor">
+              <a:schemeClr val="tx1"/>
+            </a:fontRef>
+          </p:style>
+        </p:cxnSp>
+        <p:cxnSp>
+          <p:nvCxnSpPr>
+            <p:cNvPr id="51" name="直線コネクタ 50"/>
+            <p:cNvCxnSpPr/>
+            <p:nvPr/>
+          </p:nvCxnSpPr>
+          <p:spPr>
+            <a:xfrm flipH="1">
+              <a:off x="6119913" y="5525836"/>
+              <a:ext cx="1806742" cy="0"/>
+            </a:xfrm>
+            <a:prstGeom prst="line">
+              <a:avLst/>
+            </a:prstGeom>
+            <a:ln>
+              <a:prstDash val="sysDash"/>
+            </a:ln>
+          </p:spPr>
+          <p:style>
+            <a:lnRef idx="1">
+              <a:schemeClr val="dk1"/>
+            </a:lnRef>
+            <a:fillRef idx="0">
+              <a:schemeClr val="dk1"/>
+            </a:fillRef>
+            <a:effectRef idx="0">
+              <a:schemeClr val="dk1"/>
+            </a:effectRef>
+            <a:fontRef idx="minor">
+              <a:schemeClr val="tx1"/>
+            </a:fontRef>
+          </p:style>
+        </p:cxnSp>
+        <p:sp>
+          <p:nvSpPr>
+            <p:cNvPr id="22" name="正方形/長方形 21"/>
+            <p:cNvSpPr/>
+            <p:nvPr/>
+          </p:nvSpPr>
+          <p:spPr>
+            <a:xfrm>
+              <a:off x="6464300" y="5314233"/>
+              <a:ext cx="1168400" cy="338138"/>
+            </a:xfrm>
+            <a:prstGeom prst="rect">
+              <a:avLst/>
+            </a:prstGeom>
+            <a:ln>
+              <a:noFill/>
+            </a:ln>
+          </p:spPr>
+          <p:style>
+            <a:lnRef idx="2">
+              <a:schemeClr val="dk1"/>
+            </a:lnRef>
+            <a:fillRef idx="1">
+              <a:schemeClr val="lt1"/>
+            </a:fillRef>
+            <a:effectRef idx="0">
+              <a:schemeClr val="dk1"/>
+            </a:effectRef>
+            <a:fontRef idx="minor">
+              <a:schemeClr val="dk1"/>
+            </a:fontRef>
+          </p:style>
+          <p:txBody>
+            <a:bodyPr rtlCol="0" anchor="ctr"/>
+            <a:lstStyle/>
+            <a:p>
+              <a:pPr algn="ctr"/>
+              <a:r>
+                <a:rPr lang="en-US" altLang="ja-JP" sz="1600"/>
+                <a:t>Data Area</a:t>
+              </a:r>
+              <a:endParaRPr kumimoji="1" lang="ja-JP" altLang="en-US" sz="1600"/>
+            </a:p>
+          </p:txBody>
+        </p:sp>
+      </p:grpSp>
+      <p:sp>
+        <p:nvSpPr>
+          <p:cNvPr id="39" name="正方形/長方形 38"/>
+          <p:cNvSpPr/>
+          <p:nvPr/>
+        </p:nvSpPr>
+        <p:spPr>
+          <a:xfrm>
+            <a:off x="3517900" y="3561942"/>
+            <a:ext cx="939800" cy="338138"/>
           </a:xfrm>
           <a:prstGeom prst="rect">
             <a:avLst/>
@@ -4610,10 +4653,10 @@
           <a:p>
             <a:pPr algn="ctr"/>
             <a:r>
-              <a:rPr lang="en-US" altLang="ja-JP" sz="1200"/>
-              <a:t>Allocated Area</a:t>
-            </a:r>
-            <a:endParaRPr kumimoji="1" lang="ja-JP" altLang="en-US" sz="1200"/>
+              <a:rPr lang="en-US" altLang="ja-JP" sz="1600"/>
+              <a:t>PCI BAR0</a:t>
+            </a:r>
+            <a:endParaRPr kumimoji="1" lang="ja-JP" altLang="en-US" sz="1600"/>
           </a:p>
         </p:txBody>
       </p:sp>
@@ -4656,6 +4699,45 @@
       </p:grpSpPr>
       <p:sp>
         <p:nvSpPr>
+          <p:cNvPr id="40" name="正方形/長方形 39"/>
+          <p:cNvSpPr/>
+          <p:nvPr/>
+        </p:nvSpPr>
+        <p:spPr>
+          <a:xfrm>
+            <a:off x="6119909" y="5128032"/>
+            <a:ext cx="1906491" cy="783946"/>
+          </a:xfrm>
+          <a:prstGeom prst="rect">
+            <a:avLst/>
+          </a:prstGeom>
+          <a:ln w="12700"/>
+        </p:spPr>
+        <p:style>
+          <a:lnRef idx="2">
+            <a:schemeClr val="dk1"/>
+          </a:lnRef>
+          <a:fillRef idx="1">
+            <a:schemeClr val="lt1"/>
+          </a:fillRef>
+          <a:effectRef idx="0">
+            <a:schemeClr val="dk1"/>
+          </a:effectRef>
+          <a:fontRef idx="minor">
+            <a:schemeClr val="dk1"/>
+          </a:fontRef>
+        </p:style>
+        <p:txBody>
+          <a:bodyPr rtlCol="0" anchor="ctr"/>
+          <a:lstStyle/>
+          <a:p>
+            <a:pPr algn="ctr"/>
+            <a:endParaRPr lang="en-US" altLang="ja-JP" sz="1200"/>
+          </a:p>
+        </p:txBody>
+      </p:sp>
+      <p:sp>
+        <p:nvSpPr>
           <p:cNvPr id="79" name="タイトル 78"/>
           <p:cNvSpPr>
             <a:spLocks noGrp="1"/>
@@ -4718,10 +4800,10 @@
           <a:p>
             <a:pPr algn="ctr"/>
             <a:r>
-              <a:rPr kumimoji="1" lang="en-US" altLang="ja-JP"/>
+              <a:rPr kumimoji="1" lang="en-US" altLang="ja-JP" sz="2000"/>
               <a:t>Host Memory</a:t>
             </a:r>
-            <a:endParaRPr kumimoji="1" lang="ja-JP" altLang="en-US"/>
+            <a:endParaRPr kumimoji="1" lang="ja-JP" altLang="en-US" sz="2000"/>
           </a:p>
         </p:txBody>
       </p:sp>
@@ -4773,7 +4855,7 @@
         <p:spPr>
           <a:xfrm>
             <a:off x="6119911" y="2895619"/>
-            <a:ext cx="1806743" cy="1036928"/>
+            <a:ext cx="1906489" cy="1036928"/>
           </a:xfrm>
           <a:prstGeom prst="rect">
             <a:avLst/>
@@ -4800,53 +4882,10 @@
           <a:p>
             <a:pPr algn="ctr"/>
             <a:r>
-              <a:rPr kumimoji="1" lang="en-US" altLang="ja-JP" sz="1200"/>
+              <a:rPr kumimoji="1" lang="en-US" altLang="ja-JP" sz="1600"/>
               <a:t>I/O Register </a:t>
             </a:r>
-            <a:endParaRPr kumimoji="1" lang="ja-JP" altLang="en-US" sz="1200"/>
-          </a:p>
-        </p:txBody>
-      </p:sp>
-      <p:sp>
-        <p:nvSpPr>
-          <p:cNvPr id="14" name="正方形/長方形 13"/>
-          <p:cNvSpPr/>
-          <p:nvPr/>
-        </p:nvSpPr>
-        <p:spPr>
-          <a:xfrm>
-            <a:off x="6119911" y="5125659"/>
-            <a:ext cx="1806743" cy="386141"/>
-          </a:xfrm>
-          <a:prstGeom prst="rect">
-            <a:avLst/>
-          </a:prstGeom>
-          <a:ln w="12700"/>
-        </p:spPr>
-        <p:style>
-          <a:lnRef idx="2">
-            <a:schemeClr val="dk1"/>
-          </a:lnRef>
-          <a:fillRef idx="1">
-            <a:schemeClr val="lt1"/>
-          </a:fillRef>
-          <a:effectRef idx="0">
-            <a:schemeClr val="dk1"/>
-          </a:effectRef>
-          <a:fontRef idx="minor">
-            <a:schemeClr val="dk1"/>
-          </a:fontRef>
-        </p:style>
-        <p:txBody>
-          <a:bodyPr rtlCol="0" anchor="ctr"/>
-          <a:lstStyle/>
-          <a:p>
-            <a:pPr algn="ctr"/>
-            <a:r>
-              <a:rPr kumimoji="1" lang="en-US" altLang="ja-JP" sz="1200"/>
-              <a:t>Allocated Area</a:t>
-            </a:r>
-            <a:endParaRPr kumimoji="1" lang="ja-JP" altLang="en-US" sz="1200"/>
+            <a:endParaRPr kumimoji="1" lang="ja-JP" altLang="en-US" sz="1600"/>
           </a:p>
         </p:txBody>
       </p:sp>
@@ -4895,7 +4934,7 @@
         <p:spPr>
           <a:xfrm flipH="1">
             <a:off x="5111242" y="3409873"/>
-            <a:ext cx="814974" cy="335285"/>
+            <a:ext cx="814974" cy="41628"/>
           </a:xfrm>
           <a:prstGeom prst="straightConnector1">
             <a:avLst/>
@@ -4933,7 +4972,7 @@
         <p:spPr>
           <a:xfrm>
             <a:off x="6119911" y="2355704"/>
-            <a:ext cx="1806743" cy="536879"/>
+            <a:ext cx="1906489" cy="536879"/>
           </a:xfrm>
           <a:prstGeom prst="rect">
             <a:avLst/>
@@ -4965,10 +5004,10 @@
           <a:p>
             <a:pPr algn="ctr"/>
             <a:r>
-              <a:rPr kumimoji="1" lang="en-US" altLang="ja-JP"/>
+              <a:rPr kumimoji="1" lang="en-US" altLang="ja-JP" sz="2000"/>
               <a:t>Device</a:t>
             </a:r>
-            <a:endParaRPr kumimoji="1" lang="ja-JP" altLang="en-US"/>
+            <a:endParaRPr kumimoji="1" lang="ja-JP" altLang="en-US" sz="2000"/>
           </a:p>
         </p:txBody>
       </p:sp>
@@ -5032,14 +5071,11 @@
           </a:p>
           <a:p>
             <a:pPr algn="ctr"/>
+            <a:endParaRPr kumimoji="1" lang="en-US" altLang="ja-JP" sz="1200"/>
+          </a:p>
+          <a:p>
+            <a:pPr algn="ctr"/>
             <a:endParaRPr lang="en-US" altLang="ja-JP" sz="1200"/>
-          </a:p>
-          <a:p>
-            <a:pPr algn="ctr"/>
-            <a:r>
-              <a:rPr lang="en-US" altLang="ja-JP" sz="1200"/>
-              <a:t>BAR 0</a:t>
-            </a:r>
           </a:p>
           <a:p>
             <a:pPr algn="ctr"/>
@@ -5055,22 +5091,6 @@
           </a:p>
           <a:p>
             <a:pPr algn="ctr"/>
-            <a:endParaRPr lang="en-US" altLang="ja-JP" sz="1200"/>
-          </a:p>
-          <a:p>
-            <a:pPr algn="ctr"/>
-            <a:endParaRPr kumimoji="1" lang="en-US" altLang="ja-JP" sz="1200"/>
-          </a:p>
-          <a:p>
-            <a:pPr algn="ctr"/>
-            <a:endParaRPr lang="en-US" altLang="ja-JP" sz="1200"/>
-          </a:p>
-          <a:p>
-            <a:pPr algn="ctr"/>
-            <a:endParaRPr kumimoji="1" lang="en-US" altLang="ja-JP" sz="1200"/>
-          </a:p>
-          <a:p>
-            <a:pPr algn="ctr"/>
             <a:endParaRPr kumimoji="1" lang="ja-JP" altLang="en-US" sz="1200"/>
           </a:p>
         </p:txBody>
@@ -5083,8 +5103,8 @@
         </p:nvSpPr>
         <p:spPr>
           <a:xfrm>
-            <a:off x="4896026" y="3157844"/>
-            <a:ext cx="215216" cy="1174628"/>
+            <a:off x="4903386" y="3157844"/>
+            <a:ext cx="207856" cy="587314"/>
           </a:xfrm>
           <a:prstGeom prst="rightBracket">
             <a:avLst>
@@ -5197,14 +5217,110 @@
       </p:sp>
       <p:sp>
         <p:nvSpPr>
-          <p:cNvPr id="73" name="テキスト ボックス 72"/>
+          <p:cNvPr id="76" name="正方形/長方形 75"/>
+          <p:cNvSpPr/>
+          <p:nvPr/>
+        </p:nvSpPr>
+        <p:spPr>
+          <a:xfrm>
+            <a:off x="6119911" y="4327618"/>
+            <a:ext cx="1906489" cy="536879"/>
+          </a:xfrm>
+          <a:prstGeom prst="rect">
+            <a:avLst/>
+          </a:prstGeom>
+          <a:solidFill>
+            <a:schemeClr val="bg1">
+              <a:lumMod val="85000"/>
+            </a:schemeClr>
+          </a:solidFill>
+          <a:ln w="12700"/>
+        </p:spPr>
+        <p:style>
+          <a:lnRef idx="2">
+            <a:schemeClr val="dk1"/>
+          </a:lnRef>
+          <a:fillRef idx="1">
+            <a:schemeClr val="lt1"/>
+          </a:fillRef>
+          <a:effectRef idx="0">
+            <a:schemeClr val="dk1"/>
+          </a:effectRef>
+          <a:fontRef idx="minor">
+            <a:schemeClr val="dk1"/>
+          </a:fontRef>
+        </p:style>
+        <p:txBody>
+          <a:bodyPr rtlCol="0" anchor="ctr"/>
+          <a:lstStyle/>
+          <a:p>
+            <a:pPr algn="ctr"/>
+            <a:r>
+              <a:rPr kumimoji="1" lang="en-US" altLang="ja-JP" sz="2000"/>
+              <a:t>Device Memory</a:t>
+            </a:r>
+            <a:endParaRPr kumimoji="1" lang="ja-JP" altLang="en-US" sz="2000"/>
+          </a:p>
+        </p:txBody>
+      </p:sp>
+      <p:sp>
+        <p:nvSpPr>
+          <p:cNvPr id="80" name="正方形/長方形 79"/>
+          <p:cNvSpPr/>
+          <p:nvPr/>
+        </p:nvSpPr>
+        <p:spPr>
+          <a:xfrm>
+            <a:off x="159408" y="2341333"/>
+            <a:ext cx="1806743" cy="536879"/>
+          </a:xfrm>
+          <a:prstGeom prst="rect">
+            <a:avLst/>
+          </a:prstGeom>
+          <a:solidFill>
+            <a:schemeClr val="bg1">
+              <a:lumMod val="85000"/>
+            </a:schemeClr>
+          </a:solidFill>
+          <a:ln w="12700"/>
+        </p:spPr>
+        <p:style>
+          <a:lnRef idx="2">
+            <a:schemeClr val="dk1"/>
+          </a:lnRef>
+          <a:fillRef idx="1">
+            <a:schemeClr val="lt1"/>
+          </a:fillRef>
+          <a:effectRef idx="0">
+            <a:schemeClr val="dk1"/>
+          </a:effectRef>
+          <a:fontRef idx="minor">
+            <a:schemeClr val="dk1"/>
+          </a:fontRef>
+        </p:style>
+        <p:txBody>
+          <a:bodyPr rtlCol="0" anchor="ctr"/>
+          <a:lstStyle/>
+          <a:p>
+            <a:pPr algn="ctr"/>
+            <a:r>
+              <a:rPr lang="en-US" altLang="ja-JP" sz="2000"/>
+              <a:t>CPU</a:t>
+            </a:r>
+            <a:endParaRPr kumimoji="1" lang="en-US" altLang="ja-JP" sz="2000"/>
+          </a:p>
+        </p:txBody>
+      </p:sp>
+      <p:sp>
+        <p:nvSpPr>
+          <p:cNvPr id="82" name="テキスト ボックス 81"/>
           <p:cNvSpPr txBox="1"/>
           <p:nvPr/>
         </p:nvSpPr>
         <p:spPr>
           <a:xfrm>
-            <a:off x="2187673" y="2893545"/>
-            <a:ext cx="807721" cy="276999"/>
+            <a:off x="1062780" y="4521038"/>
+            <a:ext cx="1155485" cy="338554"/>
           </a:xfrm>
           <a:prstGeom prst="rect">
             <a:avLst/>
@@ -5218,31 +5334,36 @@
           <a:lstStyle/>
           <a:p>
             <a:r>
-              <a:rPr kumimoji="1" lang="en-US" altLang="ja-JP" sz="1200"/>
-              <a:t>0x00000000</a:t>
-            </a:r>
-            <a:endParaRPr kumimoji="1" lang="ja-JP" altLang="en-US" sz="1200"/>
+              <a:rPr kumimoji="1" lang="en-US" altLang="ja-JP" sz="1600"/>
+              <a:t>Read/Write</a:t>
+            </a:r>
+            <a:endParaRPr kumimoji="1" lang="ja-JP" altLang="en-US" sz="1600"/>
           </a:p>
         </p:txBody>
       </p:sp>
       <p:cxnSp>
         <p:nvCxnSpPr>
-          <p:cNvPr id="74" name="直線コネクタ 73"/>
-          <p:cNvCxnSpPr/>
+          <p:cNvPr id="91" name="カギ線コネクタ 90"/>
+          <p:cNvCxnSpPr>
+            <a:stCxn id="80" idx="2"/>
+            <a:endCxn id="32" idx="1"/>
+          </p:cNvCxnSpPr>
           <p:nvPr/>
         </p:nvCxnSpPr>
         <p:spPr>
-          <a:xfrm>
-            <a:off x="2283651" y="3157844"/>
-            <a:ext cx="807721" cy="0"/>
-          </a:xfrm>
-          <a:prstGeom prst="line">
+          <a:xfrm rot="16200000" flipH="1">
+            <a:off x="1046829" y="2894162"/>
+            <a:ext cx="2060497" cy="2028595"/>
+          </a:xfrm>
+          <a:prstGeom prst="bentConnector2">
             <a:avLst/>
           </a:prstGeom>
-          <a:ln w="12700">
+          <a:ln w="19050">
             <a:solidFill>
               <a:schemeClr val="tx1"/>
             </a:solidFill>
+            <a:headEnd type="arrow"/>
+            <a:tailEnd type="arrow"/>
           </a:ln>
           <a:effectLst/>
         </p:spPr>
@@ -5263,23 +5384,18 @@
       </p:cxnSp>
       <p:sp>
         <p:nvSpPr>
-          <p:cNvPr id="76" name="正方形/長方形 75"/>
+          <p:cNvPr id="27" name="正方形/長方形 26"/>
           <p:cNvSpPr/>
           <p:nvPr/>
         </p:nvSpPr>
         <p:spPr>
           <a:xfrm>
-            <a:off x="6119911" y="4327618"/>
-            <a:ext cx="1806743" cy="536879"/>
+            <a:off x="6119912" y="4859592"/>
+            <a:ext cx="1906488" cy="268439"/>
           </a:xfrm>
           <a:prstGeom prst="rect">
             <a:avLst/>
           </a:prstGeom>
-          <a:solidFill>
-            <a:schemeClr val="bg1">
-              <a:lumMod val="85000"/>
-            </a:schemeClr>
-          </a:solidFill>
           <a:ln w="12700"/>
         </p:spPr>
         <p:style>
@@ -5301,81 +5417,79 @@
           <a:lstStyle/>
           <a:p>
             <a:pPr algn="ctr"/>
-            <a:r>
-              <a:rPr kumimoji="1" lang="en-US" altLang="ja-JP"/>
-              <a:t>Device Memory</a:t>
-            </a:r>
-            <a:endParaRPr kumimoji="1" lang="ja-JP" altLang="en-US"/>
-          </a:p>
-        </p:txBody>
-      </p:sp>
-      <p:sp>
-        <p:nvSpPr>
-          <p:cNvPr id="78" name="テキスト ボックス 77"/>
-          <p:cNvSpPr txBox="1"/>
-          <p:nvPr/>
-        </p:nvSpPr>
-        <p:spPr>
-          <a:xfrm>
-            <a:off x="2066814" y="2673504"/>
-            <a:ext cx="971409" cy="276999"/>
-          </a:xfrm>
-          <a:prstGeom prst="rect">
+            <a:endParaRPr lang="en-US" altLang="ja-JP" sz="1200"/>
+          </a:p>
+        </p:txBody>
+      </p:sp>
+      <p:cxnSp>
+        <p:nvCxnSpPr>
+          <p:cNvPr id="29" name="直線コネクタ 28"/>
+          <p:cNvCxnSpPr>
+            <a:stCxn id="27" idx="3"/>
+          </p:cNvCxnSpPr>
+          <p:nvPr/>
+        </p:nvCxnSpPr>
+        <p:spPr>
+          <a:xfrm flipH="1" flipV="1">
+            <a:off x="6119913" y="4975632"/>
+            <a:ext cx="1906487" cy="18180"/>
+          </a:xfrm>
+          <a:prstGeom prst="line">
             <a:avLst/>
           </a:prstGeom>
-          <a:noFill/>
-        </p:spPr>
-        <p:txBody>
-          <a:bodyPr wrap="none" rtlCol="0">
-            <a:spAutoFit/>
-          </a:bodyPr>
-          <a:lstStyle/>
-          <a:p>
-            <a:r>
-              <a:rPr lang="en-US" altLang="ja-JP" sz="1200"/>
-              <a:t>V</a:t>
-            </a:r>
-            <a:r>
-              <a:rPr kumimoji="1" lang="en-US" altLang="ja-JP" sz="1200"/>
-              <a:t>irtual Address</a:t>
-            </a:r>
-            <a:endParaRPr kumimoji="1" lang="ja-JP" altLang="en-US" sz="1200"/>
-          </a:p>
-        </p:txBody>
-      </p:sp>
-      <p:sp>
-        <p:nvSpPr>
-          <p:cNvPr id="80" name="正方形/長方形 79"/>
+          <a:ln>
+            <a:prstDash val="sysDash"/>
+          </a:ln>
+        </p:spPr>
+        <p:style>
+          <a:lnRef idx="1">
+            <a:schemeClr val="dk1"/>
+          </a:lnRef>
+          <a:fillRef idx="0">
+            <a:schemeClr val="dk1"/>
+          </a:fillRef>
+          <a:effectRef idx="0">
+            <a:schemeClr val="dk1"/>
+          </a:effectRef>
+          <a:fontRef idx="minor">
+            <a:schemeClr val="tx1"/>
+          </a:fontRef>
+        </p:style>
+      </p:cxnSp>
+      <p:sp>
+        <p:nvSpPr>
+          <p:cNvPr id="30" name="右大かっこ 29"/>
           <p:cNvSpPr/>
           <p:nvPr/>
         </p:nvSpPr>
         <p:spPr>
-          <a:xfrm>
-            <a:off x="159408" y="2341333"/>
-            <a:ext cx="1806743" cy="536879"/>
-          </a:xfrm>
-          <a:prstGeom prst="rect">
-            <a:avLst/>
-          </a:prstGeom>
-          <a:solidFill>
-            <a:schemeClr val="bg1">
-              <a:lumMod val="85000"/>
-            </a:schemeClr>
-          </a:solidFill>
-          <a:ln w="12700"/>
+          <a:xfrm flipH="1">
+            <a:off x="5926214" y="5145186"/>
+            <a:ext cx="193698" cy="366613"/>
+          </a:xfrm>
+          <a:prstGeom prst="rightBracket">
+            <a:avLst>
+              <a:gd name="adj" fmla="val 29762"/>
+            </a:avLst>
+          </a:prstGeom>
+          <a:ln>
+            <a:solidFill>
+              <a:schemeClr val="tx1"/>
+            </a:solidFill>
+          </a:ln>
         </p:spPr>
         <p:style>
           <a:lnRef idx="2">
-            <a:schemeClr val="dk1"/>
+            <a:schemeClr val="accent1"/>
           </a:lnRef>
-          <a:fillRef idx="1">
-            <a:schemeClr val="lt1"/>
+          <a:fillRef idx="0">
+            <a:schemeClr val="accent1"/>
           </a:fillRef>
-          <a:effectRef idx="0">
-            <a:schemeClr val="dk1"/>
+          <a:effectRef idx="1">
+            <a:schemeClr val="accent1"/>
           </a:effectRef>
           <a:fontRef idx="minor">
-            <a:schemeClr val="dk1"/>
+            <a:schemeClr val="tx1"/>
           </a:fontRef>
         </p:style>
         <p:txBody>
@@ -5383,59 +5497,25 @@
           <a:lstStyle/>
           <a:p>
             <a:pPr algn="ctr"/>
-            <a:r>
-              <a:rPr lang="en-US" altLang="ja-JP"/>
-              <a:t>CPU</a:t>
-            </a:r>
-            <a:endParaRPr kumimoji="1" lang="en-US" altLang="ja-JP"/>
-          </a:p>
-        </p:txBody>
-      </p:sp>
-      <p:sp>
-        <p:nvSpPr>
-          <p:cNvPr id="82" name="テキスト ボックス 81"/>
-          <p:cNvSpPr txBox="1"/>
-          <p:nvPr/>
-        </p:nvSpPr>
-        <p:spPr>
-          <a:xfrm>
-            <a:off x="1062780" y="3263260"/>
-            <a:ext cx="852104" cy="261610"/>
-          </a:xfrm>
-          <a:prstGeom prst="rect">
-            <a:avLst/>
-          </a:prstGeom>
-          <a:noFill/>
-        </p:spPr>
-        <p:txBody>
-          <a:bodyPr wrap="none" rtlCol="0">
-            <a:spAutoFit/>
-          </a:bodyPr>
-          <a:lstStyle/>
-          <a:p>
-            <a:r>
-              <a:rPr kumimoji="1" lang="en-US" altLang="ja-JP" sz="1100"/>
-              <a:t>Read/Write</a:t>
-            </a:r>
-            <a:endParaRPr kumimoji="1" lang="ja-JP" altLang="en-US" sz="1100"/>
+            <a:endParaRPr kumimoji="1" lang="ja-JP" altLang="en-US"/>
           </a:p>
         </p:txBody>
       </p:sp>
       <p:cxnSp>
         <p:nvCxnSpPr>
-          <p:cNvPr id="91" name="カギ線コネクタ 90"/>
+          <p:cNvPr id="31" name="直線矢印コネクタ 30"/>
           <p:cNvCxnSpPr>
-            <a:stCxn id="80" idx="2"/>
-            <a:endCxn id="32" idx="1"/>
+            <a:stCxn id="30" idx="2"/>
+            <a:endCxn id="33" idx="2"/>
           </p:cNvCxnSpPr>
           <p:nvPr/>
         </p:nvCxnSpPr>
         <p:spPr>
-          <a:xfrm rot="16200000" flipH="1">
-            <a:off x="1046829" y="2894162"/>
-            <a:ext cx="2060497" cy="2028595"/>
-          </a:xfrm>
-          <a:prstGeom prst="bentConnector2">
+          <a:xfrm flipH="1" flipV="1">
+            <a:off x="5093776" y="4938708"/>
+            <a:ext cx="832438" cy="389785"/>
+          </a:xfrm>
+          <a:prstGeom prst="straightConnector1">
             <a:avLst/>
           </a:prstGeom>
           <a:ln w="19050">
@@ -5464,14 +5544,14 @@
       </p:cxnSp>
       <p:sp>
         <p:nvSpPr>
-          <p:cNvPr id="27" name="正方形/長方形 26"/>
+          <p:cNvPr id="35" name="正方形/長方形 34"/>
           <p:cNvSpPr/>
           <p:nvPr/>
         </p:nvSpPr>
         <p:spPr>
           <a:xfrm>
-            <a:off x="6119912" y="4859592"/>
-            <a:ext cx="1806743" cy="268439"/>
+            <a:off x="6119910" y="5911978"/>
+            <a:ext cx="1906490" cy="485169"/>
           </a:xfrm>
           <a:prstGeom prst="rect">
             <a:avLst/>
@@ -5501,49 +5581,60 @@
           </a:p>
         </p:txBody>
       </p:sp>
-      <p:cxnSp>
-        <p:nvCxnSpPr>
-          <p:cNvPr id="29" name="直線コネクタ 28"/>
-          <p:cNvCxnSpPr/>
-          <p:nvPr/>
-        </p:nvCxnSpPr>
-        <p:spPr>
-          <a:xfrm flipH="1">
-            <a:off x="6119913" y="4975632"/>
-            <a:ext cx="1806742" cy="0"/>
-          </a:xfrm>
-          <a:prstGeom prst="line">
+      <p:sp>
+        <p:nvSpPr>
+          <p:cNvPr id="32" name="正方形/長方形 31"/>
+          <p:cNvSpPr/>
+          <p:nvPr/>
+        </p:nvSpPr>
+        <p:spPr>
+          <a:xfrm>
+            <a:off x="3091375" y="4345087"/>
+            <a:ext cx="1806743" cy="1187244"/>
+          </a:xfrm>
+          <a:prstGeom prst="rect">
             <a:avLst/>
           </a:prstGeom>
-          <a:ln>
-            <a:prstDash val="sysDash"/>
-          </a:ln>
+          <a:noFill/>
+          <a:ln w="12700"/>
         </p:spPr>
         <p:style>
-          <a:lnRef idx="1">
+          <a:lnRef idx="2">
             <a:schemeClr val="dk1"/>
           </a:lnRef>
-          <a:fillRef idx="0">
-            <a:schemeClr val="dk1"/>
+          <a:fillRef idx="1">
+            <a:schemeClr val="lt1"/>
           </a:fillRef>
           <a:effectRef idx="0">
             <a:schemeClr val="dk1"/>
           </a:effectRef>
           <a:fontRef idx="minor">
-            <a:schemeClr val="tx1"/>
+            <a:schemeClr val="dk1"/>
           </a:fontRef>
         </p:style>
-      </p:cxnSp>
-      <p:sp>
-        <p:nvSpPr>
-          <p:cNvPr id="30" name="右大かっこ 29"/>
+        <p:txBody>
+          <a:bodyPr rtlCol="0" anchor="ctr"/>
+          <a:lstStyle/>
+          <a:p>
+            <a:pPr algn="ctr"/>
+            <a:r>
+              <a:rPr lang="en-US" altLang="ja-JP" sz="1600"/>
+              <a:t>PCI BAR1</a:t>
+            </a:r>
+            <a:endParaRPr kumimoji="1" lang="en-US" altLang="ja-JP" sz="1600"/>
+          </a:p>
+        </p:txBody>
+      </p:sp>
+      <p:sp>
+        <p:nvSpPr>
+          <p:cNvPr id="33" name="右大かっこ 32"/>
           <p:cNvSpPr/>
           <p:nvPr/>
         </p:nvSpPr>
         <p:spPr>
-          <a:xfrm flipH="1">
-            <a:off x="5926214" y="5119786"/>
-            <a:ext cx="193698" cy="366613"/>
+          <a:xfrm>
+            <a:off x="4878560" y="4351394"/>
+            <a:ext cx="215216" cy="1174628"/>
           </a:xfrm>
           <a:prstGeom prst="rightBracket">
             <a:avLst>
@@ -5581,39 +5672,31 @@
       </p:sp>
       <p:cxnSp>
         <p:nvCxnSpPr>
-          <p:cNvPr id="31" name="直線矢印コネクタ 30"/>
-          <p:cNvCxnSpPr>
-            <a:stCxn id="30" idx="2"/>
-            <a:endCxn id="33" idx="2"/>
-          </p:cNvCxnSpPr>
+          <p:cNvPr id="38" name="直線コネクタ 37"/>
+          <p:cNvCxnSpPr/>
           <p:nvPr/>
         </p:nvCxnSpPr>
         <p:spPr>
-          <a:xfrm flipH="1" flipV="1">
-            <a:off x="5093776" y="4938708"/>
-            <a:ext cx="832438" cy="364385"/>
-          </a:xfrm>
-          <a:prstGeom prst="straightConnector1">
+          <a:xfrm flipH="1">
+            <a:off x="3096644" y="3745158"/>
+            <a:ext cx="1806742" cy="0"/>
+          </a:xfrm>
+          <a:prstGeom prst="line">
             <a:avLst/>
           </a:prstGeom>
-          <a:ln w="19050">
-            <a:solidFill>
-              <a:schemeClr val="tx1"/>
-            </a:solidFill>
-            <a:headEnd type="arrow"/>
-            <a:tailEnd type="arrow"/>
+          <a:ln>
+            <a:prstDash val="sysDash"/>
           </a:ln>
-          <a:effectLst/>
         </p:spPr>
         <p:style>
-          <a:lnRef idx="2">
-            <a:schemeClr val="accent1"/>
+          <a:lnRef idx="1">
+            <a:schemeClr val="dk1"/>
           </a:lnRef>
           <a:fillRef idx="0">
-            <a:schemeClr val="accent1"/>
+            <a:schemeClr val="dk1"/>
           </a:fillRef>
-          <a:effectRef idx="1">
-            <a:schemeClr val="accent1"/>
+          <a:effectRef idx="0">
+            <a:schemeClr val="dk1"/>
           </a:effectRef>
           <a:fontRef idx="minor">
             <a:schemeClr val="tx1"/>
@@ -5622,19 +5705,21 @@
       </p:cxnSp>
       <p:sp>
         <p:nvSpPr>
-          <p:cNvPr id="35" name="正方形/長方形 34"/>
+          <p:cNvPr id="39" name="正方形/長方形 38"/>
           <p:cNvSpPr/>
           <p:nvPr/>
         </p:nvSpPr>
         <p:spPr>
           <a:xfrm>
-            <a:off x="6119910" y="5499100"/>
-            <a:ext cx="1806743" cy="898047"/>
+            <a:off x="3517900" y="3561942"/>
+            <a:ext cx="939800" cy="338138"/>
           </a:xfrm>
           <a:prstGeom prst="rect">
             <a:avLst/>
           </a:prstGeom>
-          <a:ln w="12700"/>
+          <a:ln>
+            <a:noFill/>
+          </a:ln>
         </p:spPr>
         <p:style>
           <a:lnRef idx="2">
@@ -5655,20 +5740,26 @@
           <a:lstStyle/>
           <a:p>
             <a:pPr algn="ctr"/>
-            <a:endParaRPr lang="en-US" altLang="ja-JP" sz="1200"/>
+            <a:r>
+              <a:rPr lang="en-US" altLang="ja-JP" sz="1600"/>
+              <a:t>PCI BAR0</a:t>
+            </a:r>
+            <a:endParaRPr kumimoji="1" lang="ja-JP" altLang="en-US" sz="1600"/>
           </a:p>
         </p:txBody>
       </p:sp>
       <p:cxnSp>
         <p:nvCxnSpPr>
-          <p:cNvPr id="37" name="直線コネクタ 36"/>
-          <p:cNvCxnSpPr/>
+          <p:cNvPr id="42" name="直線コネクタ 41"/>
+          <p:cNvCxnSpPr>
+            <a:stCxn id="40" idx="3"/>
+          </p:cNvCxnSpPr>
           <p:nvPr/>
         </p:nvCxnSpPr>
         <p:spPr>
           <a:xfrm flipH="1">
-            <a:off x="6119910" y="5940832"/>
-            <a:ext cx="1806742" cy="0"/>
+            <a:off x="6119913" y="5520005"/>
+            <a:ext cx="1906487" cy="5831"/>
           </a:xfrm>
           <a:prstGeom prst="line">
             <a:avLst/>
@@ -5694,20 +5785,21 @@
       </p:cxnSp>
       <p:sp>
         <p:nvSpPr>
-          <p:cNvPr id="32" name="正方形/長方形 31"/>
+          <p:cNvPr id="43" name="正方形/長方形 42"/>
           <p:cNvSpPr/>
           <p:nvPr/>
         </p:nvSpPr>
         <p:spPr>
           <a:xfrm>
-            <a:off x="3091375" y="4345087"/>
-            <a:ext cx="1806743" cy="1187244"/>
+            <a:off x="6464300" y="5314233"/>
+            <a:ext cx="1168400" cy="338138"/>
           </a:xfrm>
           <a:prstGeom prst="rect">
             <a:avLst/>
           </a:prstGeom>
-          <a:noFill/>
-          <a:ln w="12700"/>
+          <a:ln>
+            <a:noFill/>
+          </a:ln>
         </p:spPr>
         <p:style>
           <a:lnRef idx="2">
@@ -5728,118 +5820,49 @@
           <a:lstStyle/>
           <a:p>
             <a:pPr algn="ctr"/>
-            <a:endParaRPr lang="en-US" altLang="ja-JP" sz="1200"/>
-          </a:p>
-          <a:p>
-            <a:pPr algn="ctr"/>
-            <a:endParaRPr lang="en-US" altLang="ja-JP" sz="1200"/>
-          </a:p>
-          <a:p>
-            <a:pPr algn="ctr"/>
-            <a:endParaRPr lang="en-US" altLang="ja-JP" sz="1200"/>
-          </a:p>
-          <a:p>
-            <a:pPr algn="ctr"/>
-            <a:endParaRPr lang="en-US" altLang="ja-JP" sz="1200"/>
-          </a:p>
-          <a:p>
-            <a:pPr algn="ctr"/>
-            <a:endParaRPr lang="en-US" altLang="ja-JP" sz="1200"/>
-          </a:p>
-          <a:p>
-            <a:pPr algn="ctr"/>
-            <a:endParaRPr lang="en-US" altLang="ja-JP" sz="1200"/>
-          </a:p>
-          <a:p>
-            <a:pPr algn="ctr"/>
-            <a:endParaRPr lang="en-US" altLang="ja-JP" sz="1200"/>
-          </a:p>
-          <a:p>
-            <a:pPr algn="ctr"/>
-            <a:r>
-              <a:rPr lang="en-US" altLang="ja-JP" sz="1200"/>
-              <a:t>BAR 1</a:t>
-            </a:r>
-          </a:p>
-          <a:p>
-            <a:pPr algn="ctr"/>
-            <a:endParaRPr kumimoji="1" lang="en-US" altLang="ja-JP" sz="1200"/>
-          </a:p>
-          <a:p>
-            <a:pPr algn="ctr"/>
-            <a:endParaRPr lang="en-US" altLang="ja-JP" sz="1200"/>
-          </a:p>
-          <a:p>
-            <a:pPr algn="ctr"/>
-            <a:endParaRPr kumimoji="1" lang="en-US" altLang="ja-JP" sz="1200"/>
-          </a:p>
-          <a:p>
-            <a:pPr algn="ctr"/>
-            <a:endParaRPr lang="en-US" altLang="ja-JP" sz="1200"/>
-          </a:p>
-          <a:p>
-            <a:pPr algn="ctr"/>
-            <a:endParaRPr kumimoji="1" lang="en-US" altLang="ja-JP" sz="1200"/>
-          </a:p>
-          <a:p>
-            <a:pPr algn="ctr"/>
-            <a:endParaRPr lang="en-US" altLang="ja-JP" sz="1200"/>
-          </a:p>
-          <a:p>
-            <a:pPr algn="ctr"/>
-            <a:endParaRPr kumimoji="1" lang="en-US" altLang="ja-JP" sz="1200"/>
-          </a:p>
-          <a:p>
-            <a:pPr algn="ctr"/>
-            <a:endParaRPr kumimoji="1" lang="ja-JP" altLang="en-US" sz="1200"/>
-          </a:p>
-        </p:txBody>
-      </p:sp>
-      <p:sp>
-        <p:nvSpPr>
-          <p:cNvPr id="33" name="右大かっこ 32"/>
-          <p:cNvSpPr/>
-          <p:nvPr/>
-        </p:nvSpPr>
-        <p:spPr>
-          <a:xfrm>
-            <a:off x="4878560" y="4351394"/>
-            <a:ext cx="215216" cy="1174628"/>
-          </a:xfrm>
-          <a:prstGeom prst="rightBracket">
-            <a:avLst>
-              <a:gd name="adj" fmla="val 29762"/>
-            </a:avLst>
+            <a:r>
+              <a:rPr lang="en-US" altLang="ja-JP" sz="1600"/>
+              <a:t>Data Area</a:t>
+            </a:r>
+            <a:endParaRPr kumimoji="1" lang="ja-JP" altLang="en-US" sz="1600"/>
+          </a:p>
+        </p:txBody>
+      </p:sp>
+      <p:cxnSp>
+        <p:nvCxnSpPr>
+          <p:cNvPr id="44" name="直線コネクタ 43"/>
+          <p:cNvCxnSpPr>
+            <a:stCxn id="35" idx="3"/>
+          </p:cNvCxnSpPr>
+          <p:nvPr/>
+        </p:nvCxnSpPr>
+        <p:spPr>
+          <a:xfrm flipH="1">
+            <a:off x="6119913" y="6154563"/>
+            <a:ext cx="1906487" cy="2169"/>
+          </a:xfrm>
+          <a:prstGeom prst="line">
+            <a:avLst/>
           </a:prstGeom>
           <a:ln>
-            <a:solidFill>
-              <a:schemeClr val="tx1"/>
-            </a:solidFill>
+            <a:prstDash val="sysDash"/>
           </a:ln>
         </p:spPr>
         <p:style>
-          <a:lnRef idx="2">
-            <a:schemeClr val="accent1"/>
+          <a:lnRef idx="1">
+            <a:schemeClr val="dk1"/>
           </a:lnRef>
           <a:fillRef idx="0">
-            <a:schemeClr val="accent1"/>
+            <a:schemeClr val="dk1"/>
           </a:fillRef>
-          <a:effectRef idx="1">
-            <a:schemeClr val="accent1"/>
+          <a:effectRef idx="0">
+            <a:schemeClr val="dk1"/>
           </a:effectRef>
           <a:fontRef idx="minor">
             <a:schemeClr val="tx1"/>
           </a:fontRef>
         </p:style>
-        <p:txBody>
-          <a:bodyPr rtlCol="0" anchor="ctr"/>
-          <a:lstStyle/>
-          <a:p>
-            <a:pPr algn="ctr"/>
-            <a:endParaRPr kumimoji="1" lang="ja-JP" altLang="en-US"/>
-          </a:p>
-        </p:txBody>
-      </p:sp>
+      </p:cxnSp>
     </p:spTree>
     <p:extLst>
       <p:ext uri="{BB962C8B-B14F-4D97-AF65-F5344CB8AC3E}">
@@ -5940,10 +5963,10 @@
           <a:p>
             <a:pPr algn="ctr"/>
             <a:r>
-              <a:rPr kumimoji="1" lang="en-US" altLang="ja-JP"/>
+              <a:rPr kumimoji="1" lang="en-US" altLang="ja-JP" sz="2000"/>
               <a:t>Host Memory</a:t>
             </a:r>
-            <a:endParaRPr kumimoji="1" lang="ja-JP" altLang="en-US"/>
+            <a:endParaRPr kumimoji="1" lang="ja-JP" altLang="en-US" sz="2000"/>
           </a:p>
         </p:txBody>
       </p:sp>
@@ -5995,7 +6018,7 @@
         <p:spPr>
           <a:xfrm>
             <a:off x="6119913" y="3152307"/>
-            <a:ext cx="1806743" cy="386141"/>
+            <a:ext cx="1906487" cy="386141"/>
           </a:xfrm>
           <a:prstGeom prst="rect">
             <a:avLst/>
@@ -6022,10 +6045,10 @@
           <a:p>
             <a:pPr algn="ctr"/>
             <a:r>
-              <a:rPr lang="en-US" altLang="ja-JP" sz="1200"/>
+              <a:rPr lang="en-US" altLang="ja-JP" sz="1600"/>
               <a:t>Data Area</a:t>
             </a:r>
-            <a:endParaRPr kumimoji="1" lang="ja-JP" altLang="en-US" sz="1200"/>
+            <a:endParaRPr kumimoji="1" lang="ja-JP" altLang="en-US" sz="1600"/>
           </a:p>
         </p:txBody>
       </p:sp>
@@ -6039,6 +6062,481 @@
           <a:xfrm flipH="1">
             <a:off x="975525" y="3027848"/>
             <a:ext cx="1806742" cy="0"/>
+          </a:xfrm>
+          <a:prstGeom prst="line">
+            <a:avLst/>
+          </a:prstGeom>
+          <a:ln>
+            <a:prstDash val="sysDash"/>
+          </a:ln>
+        </p:spPr>
+        <p:style>
+          <a:lnRef idx="1">
+            <a:schemeClr val="dk1"/>
+          </a:lnRef>
+          <a:fillRef idx="0">
+            <a:schemeClr val="dk1"/>
+          </a:fillRef>
+          <a:effectRef idx="0">
+            <a:schemeClr val="dk1"/>
+          </a:effectRef>
+          <a:fontRef idx="minor">
+            <a:schemeClr val="tx1"/>
+          </a:fontRef>
+        </p:style>
+      </p:cxnSp>
+      <p:sp>
+        <p:nvSpPr>
+          <p:cNvPr id="24" name="正方形/長方形 23"/>
+          <p:cNvSpPr/>
+          <p:nvPr/>
+        </p:nvSpPr>
+        <p:spPr>
+          <a:xfrm>
+            <a:off x="975524" y="3180247"/>
+            <a:ext cx="1806743" cy="1187243"/>
+          </a:xfrm>
+          <a:prstGeom prst="rect">
+            <a:avLst/>
+          </a:prstGeom>
+          <a:noFill/>
+          <a:ln w="12700"/>
+        </p:spPr>
+        <p:style>
+          <a:lnRef idx="2">
+            <a:schemeClr val="dk1"/>
+          </a:lnRef>
+          <a:fillRef idx="1">
+            <a:schemeClr val="lt1"/>
+          </a:fillRef>
+          <a:effectRef idx="0">
+            <a:schemeClr val="dk1"/>
+          </a:effectRef>
+          <a:fontRef idx="minor">
+            <a:schemeClr val="dk1"/>
+          </a:fontRef>
+        </p:style>
+        <p:txBody>
+          <a:bodyPr rtlCol="0" anchor="ctr"/>
+          <a:lstStyle/>
+          <a:p>
+            <a:pPr algn="ctr"/>
+            <a:endParaRPr lang="en-US" altLang="ja-JP" sz="1200"/>
+          </a:p>
+          <a:p>
+            <a:pPr algn="ctr"/>
+            <a:endParaRPr lang="en-US" altLang="ja-JP" sz="1200"/>
+          </a:p>
+          <a:p>
+            <a:pPr algn="ctr"/>
+            <a:endParaRPr lang="en-US" altLang="ja-JP" sz="1200"/>
+          </a:p>
+          <a:p>
+            <a:pPr algn="ctr"/>
+            <a:endParaRPr lang="en-US" altLang="ja-JP" sz="1200"/>
+          </a:p>
+          <a:p>
+            <a:pPr algn="ctr"/>
+            <a:endParaRPr lang="en-US" altLang="ja-JP" sz="1200"/>
+          </a:p>
+          <a:p>
+            <a:pPr algn="ctr"/>
+            <a:endParaRPr lang="en-US" altLang="ja-JP" sz="1200"/>
+          </a:p>
+          <a:p>
+            <a:pPr algn="ctr"/>
+            <a:r>
+              <a:rPr lang="en-US" altLang="ja-JP" sz="1600"/>
+              <a:t/>
+            </a:r>
+            <a:br>
+              <a:rPr lang="en-US" altLang="ja-JP" sz="1600"/>
+            </a:br>
+            <a:r>
+              <a:rPr lang="en-US" altLang="ja-JP" sz="1600"/>
+              <a:t>Pinned Memory Area</a:t>
+            </a:r>
+          </a:p>
+          <a:p>
+            <a:pPr algn="ctr"/>
+            <a:endParaRPr kumimoji="1" lang="en-US" altLang="ja-JP" sz="1200"/>
+          </a:p>
+          <a:p>
+            <a:pPr algn="ctr"/>
+            <a:endParaRPr lang="en-US" altLang="ja-JP" sz="1200"/>
+          </a:p>
+          <a:p>
+            <a:pPr algn="ctr"/>
+            <a:endParaRPr kumimoji="1" lang="en-US" altLang="ja-JP" sz="1200"/>
+          </a:p>
+          <a:p>
+            <a:pPr algn="ctr"/>
+            <a:endParaRPr lang="en-US" altLang="ja-JP" sz="1200"/>
+          </a:p>
+          <a:p>
+            <a:pPr algn="ctr"/>
+            <a:endParaRPr kumimoji="1" lang="en-US" altLang="ja-JP" sz="1200"/>
+          </a:p>
+          <a:p>
+            <a:pPr algn="ctr"/>
+            <a:endParaRPr lang="en-US" altLang="ja-JP" sz="1200"/>
+          </a:p>
+          <a:p>
+            <a:pPr algn="ctr"/>
+            <a:endParaRPr kumimoji="1" lang="en-US" altLang="ja-JP" sz="1200"/>
+          </a:p>
+          <a:p>
+            <a:pPr algn="ctr"/>
+            <a:endParaRPr kumimoji="1" lang="ja-JP" altLang="en-US" sz="1200"/>
+          </a:p>
+        </p:txBody>
+      </p:sp>
+      <p:sp>
+        <p:nvSpPr>
+          <p:cNvPr id="48" name="右大かっこ 47"/>
+          <p:cNvSpPr/>
+          <p:nvPr/>
+        </p:nvSpPr>
+        <p:spPr>
+          <a:xfrm>
+            <a:off x="2780179" y="3180247"/>
+            <a:ext cx="215216" cy="1174628"/>
+          </a:xfrm>
+          <a:prstGeom prst="rightBracket">
+            <a:avLst>
+              <a:gd name="adj" fmla="val 29762"/>
+            </a:avLst>
+          </a:prstGeom>
+          <a:ln>
+            <a:solidFill>
+              <a:schemeClr val="tx1"/>
+            </a:solidFill>
+          </a:ln>
+        </p:spPr>
+        <p:style>
+          <a:lnRef idx="2">
+            <a:schemeClr val="accent1"/>
+          </a:lnRef>
+          <a:fillRef idx="0">
+            <a:schemeClr val="accent1"/>
+          </a:fillRef>
+          <a:effectRef idx="1">
+            <a:schemeClr val="accent1"/>
+          </a:effectRef>
+          <a:fontRef idx="minor">
+            <a:schemeClr val="tx1"/>
+          </a:fontRef>
+        </p:style>
+        <p:txBody>
+          <a:bodyPr rtlCol="0" anchor="ctr"/>
+          <a:lstStyle/>
+          <a:p>
+            <a:pPr algn="ctr"/>
+            <a:endParaRPr kumimoji="1" lang="ja-JP" altLang="en-US"/>
+          </a:p>
+        </p:txBody>
+      </p:sp>
+      <p:sp>
+        <p:nvSpPr>
+          <p:cNvPr id="76" name="正方形/長方形 75"/>
+          <p:cNvSpPr/>
+          <p:nvPr/>
+        </p:nvSpPr>
+        <p:spPr>
+          <a:xfrm>
+            <a:off x="6119913" y="2354266"/>
+            <a:ext cx="1906487" cy="536879"/>
+          </a:xfrm>
+          <a:prstGeom prst="rect">
+            <a:avLst/>
+          </a:prstGeom>
+          <a:solidFill>
+            <a:schemeClr val="bg1">
+              <a:lumMod val="85000"/>
+            </a:schemeClr>
+          </a:solidFill>
+          <a:ln w="12700"/>
+        </p:spPr>
+        <p:style>
+          <a:lnRef idx="2">
+            <a:schemeClr val="dk1"/>
+          </a:lnRef>
+          <a:fillRef idx="1">
+            <a:schemeClr val="lt1"/>
+          </a:fillRef>
+          <a:effectRef idx="0">
+            <a:schemeClr val="dk1"/>
+          </a:effectRef>
+          <a:fontRef idx="minor">
+            <a:schemeClr val="dk1"/>
+          </a:fontRef>
+        </p:style>
+        <p:txBody>
+          <a:bodyPr rtlCol="0" anchor="ctr"/>
+          <a:lstStyle/>
+          <a:p>
+            <a:pPr algn="ctr"/>
+            <a:r>
+              <a:rPr kumimoji="1" lang="en-US" altLang="ja-JP" sz="2000"/>
+              <a:t>Device Memory</a:t>
+            </a:r>
+            <a:endParaRPr kumimoji="1" lang="ja-JP" altLang="en-US" sz="2000"/>
+          </a:p>
+        </p:txBody>
+      </p:sp>
+      <p:sp>
+        <p:nvSpPr>
+          <p:cNvPr id="80" name="正方形/長方形 79"/>
+          <p:cNvSpPr/>
+          <p:nvPr/>
+        </p:nvSpPr>
+        <p:spPr>
+          <a:xfrm>
+            <a:off x="3429000" y="2354266"/>
+            <a:ext cx="2171700" cy="648014"/>
+          </a:xfrm>
+          <a:prstGeom prst="rect">
+            <a:avLst/>
+          </a:prstGeom>
+          <a:solidFill>
+            <a:schemeClr val="bg1">
+              <a:lumMod val="85000"/>
+            </a:schemeClr>
+          </a:solidFill>
+          <a:ln w="12700"/>
+        </p:spPr>
+        <p:style>
+          <a:lnRef idx="2">
+            <a:schemeClr val="dk1"/>
+          </a:lnRef>
+          <a:fillRef idx="1">
+            <a:schemeClr val="lt1"/>
+          </a:fillRef>
+          <a:effectRef idx="0">
+            <a:schemeClr val="dk1"/>
+          </a:effectRef>
+          <a:fontRef idx="minor">
+            <a:schemeClr val="dk1"/>
+          </a:fontRef>
+        </p:style>
+        <p:txBody>
+          <a:bodyPr rtlCol="0" anchor="ctr"/>
+          <a:lstStyle/>
+          <a:p>
+            <a:pPr algn="ctr"/>
+            <a:r>
+              <a:rPr lang="en-US" altLang="ja-JP" sz="2000"/>
+              <a:t>GPU </a:t>
+            </a:r>
+            <a:br>
+              <a:rPr lang="en-US" altLang="ja-JP" sz="2000"/>
+            </a:br>
+            <a:r>
+              <a:rPr lang="en-US" altLang="ja-JP" sz="2000"/>
+              <a:t>Micro Controllers</a:t>
+            </a:r>
+            <a:endParaRPr kumimoji="1" lang="en-US" altLang="ja-JP" sz="2000"/>
+          </a:p>
+        </p:txBody>
+      </p:sp>
+      <p:sp>
+        <p:nvSpPr>
+          <p:cNvPr id="82" name="テキスト ボックス 81"/>
+          <p:cNvSpPr txBox="1"/>
+          <p:nvPr/>
+        </p:nvSpPr>
+        <p:spPr>
+          <a:xfrm>
+            <a:off x="4019980" y="3153510"/>
+            <a:ext cx="1155485" cy="338554"/>
+          </a:xfrm>
+          <a:prstGeom prst="rect">
+            <a:avLst/>
+          </a:prstGeom>
+          <a:noFill/>
+        </p:spPr>
+        <p:txBody>
+          <a:bodyPr wrap="none" rtlCol="0">
+            <a:spAutoFit/>
+          </a:bodyPr>
+          <a:lstStyle/>
+          <a:p>
+            <a:r>
+              <a:rPr lang="en-US" altLang="ja-JP" sz="1600"/>
+              <a:t>Read/Write</a:t>
+            </a:r>
+            <a:endParaRPr kumimoji="1" lang="ja-JP" altLang="en-US" sz="1600"/>
+          </a:p>
+        </p:txBody>
+      </p:sp>
+      <p:sp>
+        <p:nvSpPr>
+          <p:cNvPr id="27" name="正方形/長方形 26"/>
+          <p:cNvSpPr/>
+          <p:nvPr/>
+        </p:nvSpPr>
+        <p:spPr>
+          <a:xfrm>
+            <a:off x="6119914" y="2886241"/>
+            <a:ext cx="1906486" cy="260194"/>
+          </a:xfrm>
+          <a:prstGeom prst="rect">
+            <a:avLst/>
+          </a:prstGeom>
+          <a:ln w="12700"/>
+        </p:spPr>
+        <p:style>
+          <a:lnRef idx="2">
+            <a:schemeClr val="dk1"/>
+          </a:lnRef>
+          <a:fillRef idx="1">
+            <a:schemeClr val="lt1"/>
+          </a:fillRef>
+          <a:effectRef idx="0">
+            <a:schemeClr val="dk1"/>
+          </a:effectRef>
+          <a:fontRef idx="minor">
+            <a:schemeClr val="dk1"/>
+          </a:fontRef>
+        </p:style>
+        <p:txBody>
+          <a:bodyPr rtlCol="0" anchor="ctr"/>
+          <a:lstStyle/>
+          <a:p>
+            <a:pPr algn="ctr"/>
+            <a:endParaRPr lang="en-US" altLang="ja-JP" sz="1200"/>
+          </a:p>
+        </p:txBody>
+      </p:sp>
+      <p:cxnSp>
+        <p:nvCxnSpPr>
+          <p:cNvPr id="29" name="直線コネクタ 28"/>
+          <p:cNvCxnSpPr/>
+          <p:nvPr/>
+        </p:nvCxnSpPr>
+        <p:spPr>
+          <a:xfrm flipH="1" flipV="1">
+            <a:off x="6119915" y="3002280"/>
+            <a:ext cx="1906485" cy="25568"/>
+          </a:xfrm>
+          <a:prstGeom prst="line">
+            <a:avLst/>
+          </a:prstGeom>
+          <a:ln>
+            <a:prstDash val="sysDash"/>
+          </a:ln>
+        </p:spPr>
+        <p:style>
+          <a:lnRef idx="1">
+            <a:schemeClr val="dk1"/>
+          </a:lnRef>
+          <a:fillRef idx="0">
+            <a:schemeClr val="dk1"/>
+          </a:fillRef>
+          <a:effectRef idx="0">
+            <a:schemeClr val="dk1"/>
+          </a:effectRef>
+          <a:fontRef idx="minor">
+            <a:schemeClr val="tx1"/>
+          </a:fontRef>
+        </p:style>
+      </p:cxnSp>
+      <p:sp>
+        <p:nvSpPr>
+          <p:cNvPr id="30" name="右大かっこ 29"/>
+          <p:cNvSpPr/>
+          <p:nvPr/>
+        </p:nvSpPr>
+        <p:spPr>
+          <a:xfrm flipH="1">
+            <a:off x="5926216" y="3146434"/>
+            <a:ext cx="193698" cy="366613"/>
+          </a:xfrm>
+          <a:prstGeom prst="rightBracket">
+            <a:avLst>
+              <a:gd name="adj" fmla="val 29762"/>
+            </a:avLst>
+          </a:prstGeom>
+          <a:ln>
+            <a:solidFill>
+              <a:schemeClr val="tx1"/>
+            </a:solidFill>
+          </a:ln>
+        </p:spPr>
+        <p:style>
+          <a:lnRef idx="2">
+            <a:schemeClr val="accent1"/>
+          </a:lnRef>
+          <a:fillRef idx="0">
+            <a:schemeClr val="accent1"/>
+          </a:fillRef>
+          <a:effectRef idx="1">
+            <a:schemeClr val="accent1"/>
+          </a:effectRef>
+          <a:fontRef idx="minor">
+            <a:schemeClr val="tx1"/>
+          </a:fontRef>
+        </p:style>
+        <p:txBody>
+          <a:bodyPr rtlCol="0" anchor="ctr"/>
+          <a:lstStyle/>
+          <a:p>
+            <a:pPr algn="ctr"/>
+            <a:endParaRPr kumimoji="1" lang="ja-JP" altLang="en-US"/>
+          </a:p>
+        </p:txBody>
+      </p:sp>
+      <p:sp>
+        <p:nvSpPr>
+          <p:cNvPr id="35" name="正方形/長方形 34"/>
+          <p:cNvSpPr/>
+          <p:nvPr/>
+        </p:nvSpPr>
+        <p:spPr>
+          <a:xfrm>
+            <a:off x="6119912" y="3525748"/>
+            <a:ext cx="1906488" cy="898047"/>
+          </a:xfrm>
+          <a:prstGeom prst="rect">
+            <a:avLst/>
+          </a:prstGeom>
+          <a:ln w="12700"/>
+        </p:spPr>
+        <p:style>
+          <a:lnRef idx="2">
+            <a:schemeClr val="dk1"/>
+          </a:lnRef>
+          <a:fillRef idx="1">
+            <a:schemeClr val="lt1"/>
+          </a:fillRef>
+          <a:effectRef idx="0">
+            <a:schemeClr val="dk1"/>
+          </a:effectRef>
+          <a:fontRef idx="minor">
+            <a:schemeClr val="dk1"/>
+          </a:fontRef>
+        </p:style>
+        <p:txBody>
+          <a:bodyPr rtlCol="0" anchor="ctr"/>
+          <a:lstStyle/>
+          <a:p>
+            <a:pPr algn="ctr"/>
+            <a:endParaRPr lang="en-US" altLang="ja-JP" sz="1200"/>
+          </a:p>
+        </p:txBody>
+      </p:sp>
+      <p:cxnSp>
+        <p:nvCxnSpPr>
+          <p:cNvPr id="37" name="直線コネクタ 36"/>
+          <p:cNvCxnSpPr>
+            <a:stCxn id="35" idx="3"/>
+          </p:cNvCxnSpPr>
+          <p:nvPr/>
+        </p:nvCxnSpPr>
+        <p:spPr>
+          <a:xfrm flipH="1" flipV="1">
+            <a:off x="6119912" y="3967480"/>
+            <a:ext cx="1906488" cy="7292"/>
           </a:xfrm>
           <a:prstGeom prst="line">
             <a:avLst/>
@@ -6073,8 +6571,8 @@
         </p:nvCxnSpPr>
         <p:spPr>
           <a:xfrm flipH="1" flipV="1">
-            <a:off x="4433332" y="2891145"/>
-            <a:ext cx="1492884" cy="438596"/>
+            <a:off x="4514850" y="3002280"/>
+            <a:ext cx="1411366" cy="327461"/>
           </a:xfrm>
           <a:prstGeom prst="straightConnector1">
             <a:avLst/>
@@ -6103,133 +6601,31 @@
           </a:fontRef>
         </p:style>
       </p:cxnSp>
-      <p:sp>
-        <p:nvSpPr>
-          <p:cNvPr id="24" name="正方形/長方形 23"/>
-          <p:cNvSpPr/>
-          <p:nvPr/>
-        </p:nvSpPr>
-        <p:spPr>
-          <a:xfrm>
-            <a:off x="975524" y="3180247"/>
-            <a:ext cx="1806743" cy="1187243"/>
-          </a:xfrm>
-          <a:prstGeom prst="rect">
+      <p:cxnSp>
+        <p:nvCxnSpPr>
+          <p:cNvPr id="31" name="直線矢印コネクタ 30"/>
+          <p:cNvCxnSpPr>
+            <a:stCxn id="80" idx="2"/>
+            <a:endCxn id="48" idx="2"/>
+          </p:cNvCxnSpPr>
+          <p:nvPr/>
+        </p:nvCxnSpPr>
+        <p:spPr>
+          <a:xfrm flipH="1">
+            <a:off x="2995395" y="3002280"/>
+            <a:ext cx="1519455" cy="765281"/>
+          </a:xfrm>
+          <a:prstGeom prst="straightConnector1">
             <a:avLst/>
           </a:prstGeom>
-          <a:noFill/>
-          <a:ln w="12700"/>
-        </p:spPr>
-        <p:style>
-          <a:lnRef idx="2">
-            <a:schemeClr val="dk1"/>
-          </a:lnRef>
-          <a:fillRef idx="1">
-            <a:schemeClr val="lt1"/>
-          </a:fillRef>
-          <a:effectRef idx="0">
-            <a:schemeClr val="dk1"/>
-          </a:effectRef>
-          <a:fontRef idx="minor">
-            <a:schemeClr val="dk1"/>
-          </a:fontRef>
-        </p:style>
-        <p:txBody>
-          <a:bodyPr rtlCol="0" anchor="ctr"/>
-          <a:lstStyle/>
-          <a:p>
-            <a:pPr algn="ctr"/>
-            <a:endParaRPr lang="en-US" altLang="ja-JP" sz="1200"/>
-          </a:p>
-          <a:p>
-            <a:pPr algn="ctr"/>
-            <a:endParaRPr lang="en-US" altLang="ja-JP" sz="1200"/>
-          </a:p>
-          <a:p>
-            <a:pPr algn="ctr"/>
-            <a:endParaRPr lang="en-US" altLang="ja-JP" sz="1200"/>
-          </a:p>
-          <a:p>
-            <a:pPr algn="ctr"/>
-            <a:endParaRPr lang="en-US" altLang="ja-JP" sz="1200"/>
-          </a:p>
-          <a:p>
-            <a:pPr algn="ctr"/>
-            <a:endParaRPr lang="en-US" altLang="ja-JP" sz="1200"/>
-          </a:p>
-          <a:p>
-            <a:pPr algn="ctr"/>
-            <a:endParaRPr lang="en-US" altLang="ja-JP" sz="1200"/>
-          </a:p>
-          <a:p>
-            <a:pPr algn="ctr"/>
-            <a:r>
-              <a:rPr lang="en-US" altLang="ja-JP" sz="1200"/>
-              <a:t/>
-            </a:r>
-            <a:br>
-              <a:rPr lang="en-US" altLang="ja-JP" sz="1200"/>
-            </a:br>
-            <a:r>
-              <a:rPr lang="en-US" altLang="ja-JP" sz="1200"/>
-              <a:t>Pinned Memory Area</a:t>
-            </a:r>
-          </a:p>
-          <a:p>
-            <a:pPr algn="ctr"/>
-            <a:endParaRPr kumimoji="1" lang="en-US" altLang="ja-JP" sz="1200"/>
-          </a:p>
-          <a:p>
-            <a:pPr algn="ctr"/>
-            <a:endParaRPr lang="en-US" altLang="ja-JP" sz="1200"/>
-          </a:p>
-          <a:p>
-            <a:pPr algn="ctr"/>
-            <a:endParaRPr kumimoji="1" lang="en-US" altLang="ja-JP" sz="1200"/>
-          </a:p>
-          <a:p>
-            <a:pPr algn="ctr"/>
-            <a:endParaRPr lang="en-US" altLang="ja-JP" sz="1200"/>
-          </a:p>
-          <a:p>
-            <a:pPr algn="ctr"/>
-            <a:endParaRPr kumimoji="1" lang="en-US" altLang="ja-JP" sz="1200"/>
-          </a:p>
-          <a:p>
-            <a:pPr algn="ctr"/>
-            <a:endParaRPr lang="en-US" altLang="ja-JP" sz="1200"/>
-          </a:p>
-          <a:p>
-            <a:pPr algn="ctr"/>
-            <a:endParaRPr kumimoji="1" lang="en-US" altLang="ja-JP" sz="1200"/>
-          </a:p>
-          <a:p>
-            <a:pPr algn="ctr"/>
-            <a:endParaRPr kumimoji="1" lang="ja-JP" altLang="en-US" sz="1200"/>
-          </a:p>
-        </p:txBody>
-      </p:sp>
-      <p:sp>
-        <p:nvSpPr>
-          <p:cNvPr id="48" name="右大かっこ 47"/>
-          <p:cNvSpPr/>
-          <p:nvPr/>
-        </p:nvSpPr>
-        <p:spPr>
-          <a:xfrm>
-            <a:off x="2780179" y="3180247"/>
-            <a:ext cx="215216" cy="1174628"/>
-          </a:xfrm>
-          <a:prstGeom prst="rightBracket">
-            <a:avLst>
-              <a:gd name="adj" fmla="val 29762"/>
-            </a:avLst>
-          </a:prstGeom>
-          <a:ln>
+          <a:ln w="19050">
             <a:solidFill>
               <a:schemeClr val="tx1"/>
             </a:solidFill>
+            <a:headEnd type="arrow"/>
+            <a:tailEnd type="arrow"/>
           </a:ln>
+          <a:effectLst/>
         </p:spPr>
         <p:style>
           <a:lnRef idx="2">
@@ -6240,377 +6636,6 @@
           </a:fillRef>
           <a:effectRef idx="1">
             <a:schemeClr val="accent1"/>
-          </a:effectRef>
-          <a:fontRef idx="minor">
-            <a:schemeClr val="tx1"/>
-          </a:fontRef>
-        </p:style>
-        <p:txBody>
-          <a:bodyPr rtlCol="0" anchor="ctr"/>
-          <a:lstStyle/>
-          <a:p>
-            <a:pPr algn="ctr"/>
-            <a:endParaRPr kumimoji="1" lang="ja-JP" altLang="en-US"/>
-          </a:p>
-        </p:txBody>
-      </p:sp>
-      <p:sp>
-        <p:nvSpPr>
-          <p:cNvPr id="76" name="正方形/長方形 75"/>
-          <p:cNvSpPr/>
-          <p:nvPr/>
-        </p:nvSpPr>
-        <p:spPr>
-          <a:xfrm>
-            <a:off x="6119913" y="2354266"/>
-            <a:ext cx="1806743" cy="536879"/>
-          </a:xfrm>
-          <a:prstGeom prst="rect">
-            <a:avLst/>
-          </a:prstGeom>
-          <a:solidFill>
-            <a:schemeClr val="bg1">
-              <a:lumMod val="85000"/>
-            </a:schemeClr>
-          </a:solidFill>
-          <a:ln w="12700"/>
-        </p:spPr>
-        <p:style>
-          <a:lnRef idx="2">
-            <a:schemeClr val="dk1"/>
-          </a:lnRef>
-          <a:fillRef idx="1">
-            <a:schemeClr val="lt1"/>
-          </a:fillRef>
-          <a:effectRef idx="0">
-            <a:schemeClr val="dk1"/>
-          </a:effectRef>
-          <a:fontRef idx="minor">
-            <a:schemeClr val="dk1"/>
-          </a:fontRef>
-        </p:style>
-        <p:txBody>
-          <a:bodyPr rtlCol="0" anchor="ctr"/>
-          <a:lstStyle/>
-          <a:p>
-            <a:pPr algn="ctr"/>
-            <a:r>
-              <a:rPr kumimoji="1" lang="en-US" altLang="ja-JP"/>
-              <a:t>Device Memory</a:t>
-            </a:r>
-            <a:endParaRPr kumimoji="1" lang="ja-JP" altLang="en-US"/>
-          </a:p>
-        </p:txBody>
-      </p:sp>
-      <p:sp>
-        <p:nvSpPr>
-          <p:cNvPr id="80" name="正方形/長方形 79"/>
-          <p:cNvSpPr/>
-          <p:nvPr/>
-        </p:nvSpPr>
-        <p:spPr>
-          <a:xfrm>
-            <a:off x="3529960" y="2354266"/>
-            <a:ext cx="1806743" cy="536879"/>
-          </a:xfrm>
-          <a:prstGeom prst="rect">
-            <a:avLst/>
-          </a:prstGeom>
-          <a:solidFill>
-            <a:schemeClr val="bg1">
-              <a:lumMod val="85000"/>
-            </a:schemeClr>
-          </a:solidFill>
-          <a:ln w="12700"/>
-        </p:spPr>
-        <p:style>
-          <a:lnRef idx="2">
-            <a:schemeClr val="dk1"/>
-          </a:lnRef>
-          <a:fillRef idx="1">
-            <a:schemeClr val="lt1"/>
-          </a:fillRef>
-          <a:effectRef idx="0">
-            <a:schemeClr val="dk1"/>
-          </a:effectRef>
-          <a:fontRef idx="minor">
-            <a:schemeClr val="dk1"/>
-          </a:fontRef>
-        </p:style>
-        <p:txBody>
-          <a:bodyPr rtlCol="0" anchor="ctr"/>
-          <a:lstStyle/>
-          <a:p>
-            <a:pPr algn="ctr"/>
-            <a:r>
-              <a:rPr lang="en-US" altLang="ja-JP"/>
-              <a:t>On-chip</a:t>
-            </a:r>
-          </a:p>
-          <a:p>
-            <a:pPr algn="ctr"/>
-            <a:r>
-              <a:rPr lang="en-US" altLang="ja-JP"/>
-              <a:t>Micro Controller</a:t>
-            </a:r>
-            <a:endParaRPr kumimoji="1" lang="en-US" altLang="ja-JP"/>
-          </a:p>
-        </p:txBody>
-      </p:sp>
-      <p:sp>
-        <p:nvSpPr>
-          <p:cNvPr id="82" name="テキスト ボックス 81"/>
-          <p:cNvSpPr txBox="1"/>
-          <p:nvPr/>
-        </p:nvSpPr>
-        <p:spPr>
-          <a:xfrm>
-            <a:off x="4007280" y="3115410"/>
-            <a:ext cx="1034132" cy="307777"/>
-          </a:xfrm>
-          <a:prstGeom prst="rect">
-            <a:avLst/>
-          </a:prstGeom>
-          <a:noFill/>
-        </p:spPr>
-        <p:txBody>
-          <a:bodyPr wrap="none" rtlCol="0">
-            <a:spAutoFit/>
-          </a:bodyPr>
-          <a:lstStyle/>
-          <a:p>
-            <a:r>
-              <a:rPr lang="en-US" altLang="ja-JP" sz="1400"/>
-              <a:t>Read/Write</a:t>
-            </a:r>
-            <a:endParaRPr kumimoji="1" lang="ja-JP" altLang="en-US" sz="1400"/>
-          </a:p>
-        </p:txBody>
-      </p:sp>
-      <p:sp>
-        <p:nvSpPr>
-          <p:cNvPr id="27" name="正方形/長方形 26"/>
-          <p:cNvSpPr/>
-          <p:nvPr/>
-        </p:nvSpPr>
-        <p:spPr>
-          <a:xfrm>
-            <a:off x="6119914" y="2886240"/>
-            <a:ext cx="1806743" cy="268439"/>
-          </a:xfrm>
-          <a:prstGeom prst="rect">
-            <a:avLst/>
-          </a:prstGeom>
-          <a:ln w="12700"/>
-        </p:spPr>
-        <p:style>
-          <a:lnRef idx="2">
-            <a:schemeClr val="dk1"/>
-          </a:lnRef>
-          <a:fillRef idx="1">
-            <a:schemeClr val="lt1"/>
-          </a:fillRef>
-          <a:effectRef idx="0">
-            <a:schemeClr val="dk1"/>
-          </a:effectRef>
-          <a:fontRef idx="minor">
-            <a:schemeClr val="dk1"/>
-          </a:fontRef>
-        </p:style>
-        <p:txBody>
-          <a:bodyPr rtlCol="0" anchor="ctr"/>
-          <a:lstStyle/>
-          <a:p>
-            <a:pPr algn="ctr"/>
-            <a:endParaRPr lang="en-US" altLang="ja-JP" sz="1200"/>
-          </a:p>
-        </p:txBody>
-      </p:sp>
-      <p:cxnSp>
-        <p:nvCxnSpPr>
-          <p:cNvPr id="29" name="直線コネクタ 28"/>
-          <p:cNvCxnSpPr/>
-          <p:nvPr/>
-        </p:nvCxnSpPr>
-        <p:spPr>
-          <a:xfrm flipH="1">
-            <a:off x="6119915" y="3002280"/>
-            <a:ext cx="1806742" cy="0"/>
-          </a:xfrm>
-          <a:prstGeom prst="line">
-            <a:avLst/>
-          </a:prstGeom>
-          <a:ln>
-            <a:prstDash val="sysDash"/>
-          </a:ln>
-        </p:spPr>
-        <p:style>
-          <a:lnRef idx="1">
-            <a:schemeClr val="dk1"/>
-          </a:lnRef>
-          <a:fillRef idx="0">
-            <a:schemeClr val="dk1"/>
-          </a:fillRef>
-          <a:effectRef idx="0">
-            <a:schemeClr val="dk1"/>
-          </a:effectRef>
-          <a:fontRef idx="minor">
-            <a:schemeClr val="tx1"/>
-          </a:fontRef>
-        </p:style>
-      </p:cxnSp>
-      <p:sp>
-        <p:nvSpPr>
-          <p:cNvPr id="30" name="右大かっこ 29"/>
-          <p:cNvSpPr/>
-          <p:nvPr/>
-        </p:nvSpPr>
-        <p:spPr>
-          <a:xfrm flipH="1">
-            <a:off x="5926216" y="3146434"/>
-            <a:ext cx="193698" cy="366613"/>
-          </a:xfrm>
-          <a:prstGeom prst="rightBracket">
-            <a:avLst>
-              <a:gd name="adj" fmla="val 29762"/>
-            </a:avLst>
-          </a:prstGeom>
-          <a:ln>
-            <a:solidFill>
-              <a:schemeClr val="tx1"/>
-            </a:solidFill>
-          </a:ln>
-        </p:spPr>
-        <p:style>
-          <a:lnRef idx="2">
-            <a:schemeClr val="accent1"/>
-          </a:lnRef>
-          <a:fillRef idx="0">
-            <a:schemeClr val="accent1"/>
-          </a:fillRef>
-          <a:effectRef idx="1">
-            <a:schemeClr val="accent1"/>
-          </a:effectRef>
-          <a:fontRef idx="minor">
-            <a:schemeClr val="tx1"/>
-          </a:fontRef>
-        </p:style>
-        <p:txBody>
-          <a:bodyPr rtlCol="0" anchor="ctr"/>
-          <a:lstStyle/>
-          <a:p>
-            <a:pPr algn="ctr"/>
-            <a:endParaRPr kumimoji="1" lang="ja-JP" altLang="en-US"/>
-          </a:p>
-        </p:txBody>
-      </p:sp>
-      <p:cxnSp>
-        <p:nvCxnSpPr>
-          <p:cNvPr id="31" name="直線矢印コネクタ 30"/>
-          <p:cNvCxnSpPr>
-            <a:stCxn id="80" idx="2"/>
-            <a:endCxn id="48" idx="2"/>
-          </p:cNvCxnSpPr>
-          <p:nvPr/>
-        </p:nvCxnSpPr>
-        <p:spPr>
-          <a:xfrm flipH="1">
-            <a:off x="2995395" y="2891145"/>
-            <a:ext cx="1437937" cy="876416"/>
-          </a:xfrm>
-          <a:prstGeom prst="straightConnector1">
-            <a:avLst/>
-          </a:prstGeom>
-          <a:ln w="19050">
-            <a:solidFill>
-              <a:schemeClr val="tx1"/>
-            </a:solidFill>
-            <a:headEnd type="arrow"/>
-            <a:tailEnd type="arrow"/>
-          </a:ln>
-          <a:effectLst/>
-        </p:spPr>
-        <p:style>
-          <a:lnRef idx="2">
-            <a:schemeClr val="accent1"/>
-          </a:lnRef>
-          <a:fillRef idx="0">
-            <a:schemeClr val="accent1"/>
-          </a:fillRef>
-          <a:effectRef idx="1">
-            <a:schemeClr val="accent1"/>
-          </a:effectRef>
-          <a:fontRef idx="minor">
-            <a:schemeClr val="tx1"/>
-          </a:fontRef>
-        </p:style>
-      </p:cxnSp>
-      <p:sp>
-        <p:nvSpPr>
-          <p:cNvPr id="35" name="正方形/長方形 34"/>
-          <p:cNvSpPr/>
-          <p:nvPr/>
-        </p:nvSpPr>
-        <p:spPr>
-          <a:xfrm>
-            <a:off x="6119912" y="3525748"/>
-            <a:ext cx="1806743" cy="898047"/>
-          </a:xfrm>
-          <a:prstGeom prst="rect">
-            <a:avLst/>
-          </a:prstGeom>
-          <a:ln w="12700"/>
-        </p:spPr>
-        <p:style>
-          <a:lnRef idx="2">
-            <a:schemeClr val="dk1"/>
-          </a:lnRef>
-          <a:fillRef idx="1">
-            <a:schemeClr val="lt1"/>
-          </a:fillRef>
-          <a:effectRef idx="0">
-            <a:schemeClr val="dk1"/>
-          </a:effectRef>
-          <a:fontRef idx="minor">
-            <a:schemeClr val="dk1"/>
-          </a:fontRef>
-        </p:style>
-        <p:txBody>
-          <a:bodyPr rtlCol="0" anchor="ctr"/>
-          <a:lstStyle/>
-          <a:p>
-            <a:pPr algn="ctr"/>
-            <a:endParaRPr lang="en-US" altLang="ja-JP" sz="1200"/>
-          </a:p>
-        </p:txBody>
-      </p:sp>
-      <p:cxnSp>
-        <p:nvCxnSpPr>
-          <p:cNvPr id="37" name="直線コネクタ 36"/>
-          <p:cNvCxnSpPr/>
-          <p:nvPr/>
-        </p:nvCxnSpPr>
-        <p:spPr>
-          <a:xfrm flipH="1">
-            <a:off x="6119912" y="3967480"/>
-            <a:ext cx="1806742" cy="0"/>
-          </a:xfrm>
-          <a:prstGeom prst="line">
-            <a:avLst/>
-          </a:prstGeom>
-          <a:ln>
-            <a:prstDash val="sysDash"/>
-          </a:ln>
-        </p:spPr>
-        <p:style>
-          <a:lnRef idx="1">
-            <a:schemeClr val="dk1"/>
-          </a:lnRef>
-          <a:fillRef idx="0">
-            <a:schemeClr val="dk1"/>
-          </a:fillRef>
-          <a:effectRef idx="0">
-            <a:schemeClr val="dk1"/>
           </a:effectRef>
           <a:fontRef idx="minor">
             <a:schemeClr val="tx1"/>
@@ -6718,10 +6743,10 @@
           <a:p>
             <a:pPr algn="ctr"/>
             <a:r>
-              <a:rPr kumimoji="1" lang="en-US" altLang="ja-JP"/>
+              <a:rPr kumimoji="1" lang="en-US" altLang="ja-JP" sz="2000"/>
               <a:t>Host Memory</a:t>
             </a:r>
-            <a:endParaRPr kumimoji="1" lang="ja-JP" altLang="en-US"/>
+            <a:endParaRPr kumimoji="1" lang="ja-JP" altLang="en-US" sz="2000"/>
           </a:p>
         </p:txBody>
       </p:sp>
@@ -6760,7 +6785,7 @@
           <a:lstStyle/>
           <a:p>
             <a:pPr algn="ctr"/>
-            <a:endParaRPr lang="en-US" altLang="ja-JP" sz="1200"/>
+            <a:endParaRPr lang="en-US" altLang="ja-JP" sz="1600"/>
           </a:p>
         </p:txBody>
       </p:sp>
@@ -6772,8 +6797,8 @@
         </p:nvSpPr>
         <p:spPr>
           <a:xfrm>
-            <a:off x="6119913" y="3152307"/>
-            <a:ext cx="1806743" cy="386141"/>
+            <a:off x="6070968" y="3152307"/>
+            <a:ext cx="1955432" cy="386141"/>
           </a:xfrm>
           <a:prstGeom prst="rect">
             <a:avLst/>
@@ -6800,10 +6825,10 @@
           <a:p>
             <a:pPr algn="ctr"/>
             <a:r>
-              <a:rPr lang="en-US" altLang="ja-JP" sz="1200"/>
+              <a:rPr lang="en-US" altLang="ja-JP" sz="1600"/>
               <a:t>Data Area</a:t>
             </a:r>
-            <a:endParaRPr kumimoji="1" lang="ja-JP" altLang="en-US" sz="1200"/>
+            <a:endParaRPr kumimoji="1" lang="ja-JP" altLang="en-US" sz="1600"/>
           </a:p>
         </p:txBody>
       </p:sp>
@@ -6840,19 +6865,362 @@
           </a:fontRef>
         </p:style>
       </p:cxnSp>
+      <p:sp>
+        <p:nvSpPr>
+          <p:cNvPr id="24" name="正方形/長方形 23"/>
+          <p:cNvSpPr/>
+          <p:nvPr/>
+        </p:nvSpPr>
+        <p:spPr>
+          <a:xfrm>
+            <a:off x="975524" y="3180247"/>
+            <a:ext cx="1806743" cy="1187243"/>
+          </a:xfrm>
+          <a:prstGeom prst="rect">
+            <a:avLst/>
+          </a:prstGeom>
+          <a:noFill/>
+          <a:ln w="12700"/>
+        </p:spPr>
+        <p:style>
+          <a:lnRef idx="2">
+            <a:schemeClr val="dk1"/>
+          </a:lnRef>
+          <a:fillRef idx="1">
+            <a:schemeClr val="lt1"/>
+          </a:fillRef>
+          <a:effectRef idx="0">
+            <a:schemeClr val="dk1"/>
+          </a:effectRef>
+          <a:fontRef idx="minor">
+            <a:schemeClr val="dk1"/>
+          </a:fontRef>
+        </p:style>
+        <p:txBody>
+          <a:bodyPr rtlCol="0" anchor="ctr"/>
+          <a:lstStyle/>
+          <a:p>
+            <a:pPr algn="ctr"/>
+            <a:r>
+              <a:rPr lang="en-US" altLang="ja-JP" sz="1600"/>
+              <a:t>Data Area</a:t>
+            </a:r>
+          </a:p>
+          <a:p>
+            <a:pPr algn="ctr"/>
+            <a:endParaRPr lang="en-US" altLang="ja-JP" sz="1600"/>
+          </a:p>
+          <a:p>
+            <a:pPr algn="ctr"/>
+            <a:endParaRPr lang="en-US" altLang="ja-JP" sz="1600"/>
+          </a:p>
+          <a:p>
+            <a:pPr algn="ctr"/>
+            <a:endParaRPr lang="en-US" altLang="ja-JP" sz="1600"/>
+          </a:p>
+        </p:txBody>
+      </p:sp>
+      <p:sp>
+        <p:nvSpPr>
+          <p:cNvPr id="48" name="右大かっこ 47"/>
+          <p:cNvSpPr/>
+          <p:nvPr/>
+        </p:nvSpPr>
+        <p:spPr>
+          <a:xfrm>
+            <a:off x="2780179" y="3296888"/>
+            <a:ext cx="215216" cy="332800"/>
+          </a:xfrm>
+          <a:prstGeom prst="rightBracket">
+            <a:avLst>
+              <a:gd name="adj" fmla="val 29762"/>
+            </a:avLst>
+          </a:prstGeom>
+          <a:ln>
+            <a:solidFill>
+              <a:schemeClr val="tx1"/>
+            </a:solidFill>
+          </a:ln>
+        </p:spPr>
+        <p:style>
+          <a:lnRef idx="2">
+            <a:schemeClr val="accent1"/>
+          </a:lnRef>
+          <a:fillRef idx="0">
+            <a:schemeClr val="accent1"/>
+          </a:fillRef>
+          <a:effectRef idx="1">
+            <a:schemeClr val="accent1"/>
+          </a:effectRef>
+          <a:fontRef idx="minor">
+            <a:schemeClr val="tx1"/>
+          </a:fontRef>
+        </p:style>
+        <p:txBody>
+          <a:bodyPr rtlCol="0" anchor="ctr"/>
+          <a:lstStyle/>
+          <a:p>
+            <a:pPr algn="ctr"/>
+            <a:endParaRPr kumimoji="1" lang="ja-JP" altLang="en-US" sz="2400"/>
+          </a:p>
+        </p:txBody>
+      </p:sp>
+      <p:sp>
+        <p:nvSpPr>
+          <p:cNvPr id="76" name="正方形/長方形 75"/>
+          <p:cNvSpPr/>
+          <p:nvPr/>
+        </p:nvSpPr>
+        <p:spPr>
+          <a:xfrm>
+            <a:off x="6119913" y="2354266"/>
+            <a:ext cx="1906487" cy="536879"/>
+          </a:xfrm>
+          <a:prstGeom prst="rect">
+            <a:avLst/>
+          </a:prstGeom>
+          <a:solidFill>
+            <a:schemeClr val="bg1">
+              <a:lumMod val="85000"/>
+            </a:schemeClr>
+          </a:solidFill>
+          <a:ln w="12700"/>
+        </p:spPr>
+        <p:style>
+          <a:lnRef idx="2">
+            <a:schemeClr val="dk1"/>
+          </a:lnRef>
+          <a:fillRef idx="1">
+            <a:schemeClr val="lt1"/>
+          </a:fillRef>
+          <a:effectRef idx="0">
+            <a:schemeClr val="dk1"/>
+          </a:effectRef>
+          <a:fontRef idx="minor">
+            <a:schemeClr val="dk1"/>
+          </a:fontRef>
+        </p:style>
+        <p:txBody>
+          <a:bodyPr rtlCol="0" anchor="ctr"/>
+          <a:lstStyle/>
+          <a:p>
+            <a:pPr algn="ctr"/>
+            <a:r>
+              <a:rPr kumimoji="1" lang="en-US" altLang="ja-JP" sz="2000"/>
+              <a:t>Device Memory</a:t>
+            </a:r>
+            <a:endParaRPr kumimoji="1" lang="ja-JP" altLang="en-US" sz="2000"/>
+          </a:p>
+        </p:txBody>
+      </p:sp>
+      <p:sp>
+        <p:nvSpPr>
+          <p:cNvPr id="80" name="正方形/長方形 79"/>
+          <p:cNvSpPr/>
+          <p:nvPr/>
+        </p:nvSpPr>
+        <p:spPr>
+          <a:xfrm>
+            <a:off x="3365500" y="2354266"/>
+            <a:ext cx="2148664" cy="536879"/>
+          </a:xfrm>
+          <a:prstGeom prst="rect">
+            <a:avLst/>
+          </a:prstGeom>
+          <a:solidFill>
+            <a:schemeClr val="bg1">
+              <a:lumMod val="85000"/>
+            </a:schemeClr>
+          </a:solidFill>
+          <a:ln w="12700"/>
+        </p:spPr>
+        <p:style>
+          <a:lnRef idx="2">
+            <a:schemeClr val="dk1"/>
+          </a:lnRef>
+          <a:fillRef idx="1">
+            <a:schemeClr val="lt1"/>
+          </a:fillRef>
+          <a:effectRef idx="0">
+            <a:schemeClr val="dk1"/>
+          </a:effectRef>
+          <a:fontRef idx="minor">
+            <a:schemeClr val="dk1"/>
+          </a:fontRef>
+        </p:style>
+        <p:txBody>
+          <a:bodyPr rtlCol="0" anchor="ctr"/>
+          <a:lstStyle/>
+          <a:p>
+            <a:pPr algn="ctr"/>
+            <a:r>
+              <a:rPr lang="en-US" altLang="ja-JP" sz="2000"/>
+              <a:t>GPU DMA Engines</a:t>
+            </a:r>
+            <a:endParaRPr kumimoji="1" lang="en-US" altLang="ja-JP" sz="2000"/>
+          </a:p>
+        </p:txBody>
+      </p:sp>
+      <p:sp>
+        <p:nvSpPr>
+          <p:cNvPr id="82" name="テキスト ボックス 81"/>
+          <p:cNvSpPr txBox="1"/>
+          <p:nvPr/>
+        </p:nvSpPr>
+        <p:spPr>
+          <a:xfrm>
+            <a:off x="3956480" y="3384559"/>
+            <a:ext cx="1492716" cy="369332"/>
+          </a:xfrm>
+          <a:prstGeom prst="rect">
+            <a:avLst/>
+          </a:prstGeom>
+          <a:noFill/>
+        </p:spPr>
+        <p:txBody>
+          <a:bodyPr wrap="none" rtlCol="0">
+            <a:spAutoFit/>
+          </a:bodyPr>
+          <a:lstStyle/>
+          <a:p>
+            <a:r>
+              <a:rPr kumimoji="1" lang="en-US" altLang="ja-JP"/>
+              <a:t>DMA Transfer</a:t>
+            </a:r>
+            <a:endParaRPr kumimoji="1" lang="ja-JP" altLang="en-US"/>
+          </a:p>
+        </p:txBody>
+      </p:sp>
+      <p:sp>
+        <p:nvSpPr>
+          <p:cNvPr id="27" name="正方形/長方形 26"/>
+          <p:cNvSpPr/>
+          <p:nvPr/>
+        </p:nvSpPr>
+        <p:spPr>
+          <a:xfrm>
+            <a:off x="6119914" y="2886240"/>
+            <a:ext cx="1906486" cy="294007"/>
+          </a:xfrm>
+          <a:prstGeom prst="rect">
+            <a:avLst/>
+          </a:prstGeom>
+          <a:ln w="12700"/>
+        </p:spPr>
+        <p:style>
+          <a:lnRef idx="2">
+            <a:schemeClr val="dk1"/>
+          </a:lnRef>
+          <a:fillRef idx="1">
+            <a:schemeClr val="lt1"/>
+          </a:fillRef>
+          <a:effectRef idx="0">
+            <a:schemeClr val="dk1"/>
+          </a:effectRef>
+          <a:fontRef idx="minor">
+            <a:schemeClr val="dk1"/>
+          </a:fontRef>
+        </p:style>
+        <p:txBody>
+          <a:bodyPr rtlCol="0" anchor="ctr"/>
+          <a:lstStyle/>
+          <a:p>
+            <a:pPr algn="ctr"/>
+            <a:endParaRPr lang="en-US" altLang="ja-JP" sz="1600"/>
+          </a:p>
+        </p:txBody>
+      </p:sp>
       <p:cxnSp>
         <p:nvCxnSpPr>
-          <p:cNvPr id="28" name="直線矢印コネクタ 27"/>
+          <p:cNvPr id="29" name="直線コネクタ 28"/>
+          <p:cNvCxnSpPr/>
+          <p:nvPr/>
+        </p:nvCxnSpPr>
+        <p:spPr>
+          <a:xfrm flipH="1" flipV="1">
+            <a:off x="6119915" y="3002280"/>
+            <a:ext cx="1906485" cy="25568"/>
+          </a:xfrm>
+          <a:prstGeom prst="line">
+            <a:avLst/>
+          </a:prstGeom>
+          <a:ln>
+            <a:prstDash val="sysDash"/>
+          </a:ln>
+        </p:spPr>
+        <p:style>
+          <a:lnRef idx="1">
+            <a:schemeClr val="dk1"/>
+          </a:lnRef>
+          <a:fillRef idx="0">
+            <a:schemeClr val="dk1"/>
+          </a:fillRef>
+          <a:effectRef idx="0">
+            <a:schemeClr val="dk1"/>
+          </a:effectRef>
+          <a:fontRef idx="minor">
+            <a:schemeClr val="tx1"/>
+          </a:fontRef>
+        </p:style>
+      </p:cxnSp>
+      <p:sp>
+        <p:nvSpPr>
+          <p:cNvPr id="30" name="右大かっこ 29"/>
+          <p:cNvSpPr/>
+          <p:nvPr/>
+        </p:nvSpPr>
+        <p:spPr>
+          <a:xfrm flipH="1">
+            <a:off x="5926216" y="3146434"/>
+            <a:ext cx="193698" cy="366613"/>
+          </a:xfrm>
+          <a:prstGeom prst="rightBracket">
+            <a:avLst>
+              <a:gd name="adj" fmla="val 29762"/>
+            </a:avLst>
+          </a:prstGeom>
+          <a:ln>
+            <a:solidFill>
+              <a:schemeClr val="tx1"/>
+            </a:solidFill>
+          </a:ln>
+        </p:spPr>
+        <p:style>
+          <a:lnRef idx="2">
+            <a:schemeClr val="accent1"/>
+          </a:lnRef>
+          <a:fillRef idx="0">
+            <a:schemeClr val="accent1"/>
+          </a:fillRef>
+          <a:effectRef idx="1">
+            <a:schemeClr val="accent1"/>
+          </a:effectRef>
+          <a:fontRef idx="minor">
+            <a:schemeClr val="tx1"/>
+          </a:fontRef>
+        </p:style>
+        <p:txBody>
+          <a:bodyPr rtlCol="0" anchor="ctr"/>
+          <a:lstStyle/>
+          <a:p>
+            <a:pPr algn="ctr"/>
+            <a:endParaRPr kumimoji="1" lang="ja-JP" altLang="en-US" sz="2400"/>
+          </a:p>
+        </p:txBody>
+      </p:sp>
+      <p:cxnSp>
+        <p:nvCxnSpPr>
+          <p:cNvPr id="31" name="直線矢印コネクタ 30"/>
           <p:cNvCxnSpPr>
             <a:stCxn id="30" idx="2"/>
-            <a:endCxn id="80" idx="2"/>
+            <a:endCxn id="48" idx="2"/>
           </p:cNvCxnSpPr>
           <p:nvPr/>
         </p:nvCxnSpPr>
         <p:spPr>
-          <a:xfrm flipH="1" flipV="1">
-            <a:off x="4433332" y="2891145"/>
-            <a:ext cx="1492884" cy="438596"/>
+          <a:xfrm flipH="1">
+            <a:off x="2995395" y="3329741"/>
+            <a:ext cx="2930821" cy="133547"/>
           </a:xfrm>
           <a:prstGeom prst="straightConnector1">
             <a:avLst/>
@@ -6883,19 +7251,18 @@
       </p:cxnSp>
       <p:sp>
         <p:nvSpPr>
-          <p:cNvPr id="24" name="正方形/長方形 23"/>
+          <p:cNvPr id="35" name="正方形/長方形 34"/>
           <p:cNvSpPr/>
           <p:nvPr/>
         </p:nvSpPr>
         <p:spPr>
           <a:xfrm>
-            <a:off x="975524" y="3180247"/>
-            <a:ext cx="1806743" cy="1187243"/>
+            <a:off x="6119912" y="3525748"/>
+            <a:ext cx="1906488" cy="898047"/>
           </a:xfrm>
           <a:prstGeom prst="rect">
             <a:avLst/>
           </a:prstGeom>
-          <a:noFill/>
           <a:ln w="12700"/>
         </p:spPr>
         <p:style>
@@ -6917,241 +7284,22 @@
           <a:lstStyle/>
           <a:p>
             <a:pPr algn="ctr"/>
-            <a:r>
-              <a:rPr lang="en-US" altLang="ja-JP" sz="1200"/>
-              <a:t>Data Area</a:t>
-            </a:r>
-            <a:endParaRPr lang="en-US" altLang="ja-JP" sz="1200"/>
-          </a:p>
-        </p:txBody>
-      </p:sp>
-      <p:sp>
-        <p:nvSpPr>
-          <p:cNvPr id="48" name="右大かっこ 47"/>
-          <p:cNvSpPr/>
-          <p:nvPr/>
-        </p:nvSpPr>
-        <p:spPr>
-          <a:xfrm>
-            <a:off x="2780179" y="3180247"/>
-            <a:ext cx="215216" cy="1174628"/>
-          </a:xfrm>
-          <a:prstGeom prst="rightBracket">
-            <a:avLst>
-              <a:gd name="adj" fmla="val 29762"/>
-            </a:avLst>
-          </a:prstGeom>
-          <a:ln>
-            <a:solidFill>
-              <a:schemeClr val="tx1"/>
-            </a:solidFill>
-          </a:ln>
-        </p:spPr>
-        <p:style>
-          <a:lnRef idx="2">
-            <a:schemeClr val="accent1"/>
-          </a:lnRef>
-          <a:fillRef idx="0">
-            <a:schemeClr val="accent1"/>
-          </a:fillRef>
-          <a:effectRef idx="1">
-            <a:schemeClr val="accent1"/>
-          </a:effectRef>
-          <a:fontRef idx="minor">
-            <a:schemeClr val="tx1"/>
-          </a:fontRef>
-        </p:style>
-        <p:txBody>
-          <a:bodyPr rtlCol="0" anchor="ctr"/>
-          <a:lstStyle/>
-          <a:p>
-            <a:pPr algn="ctr"/>
-            <a:endParaRPr kumimoji="1" lang="ja-JP" altLang="en-US"/>
-          </a:p>
-        </p:txBody>
-      </p:sp>
-      <p:sp>
-        <p:nvSpPr>
-          <p:cNvPr id="76" name="正方形/長方形 75"/>
-          <p:cNvSpPr/>
-          <p:nvPr/>
-        </p:nvSpPr>
-        <p:spPr>
-          <a:xfrm>
-            <a:off x="6119913" y="2354266"/>
-            <a:ext cx="1806743" cy="536879"/>
-          </a:xfrm>
-          <a:prstGeom prst="rect">
-            <a:avLst/>
-          </a:prstGeom>
-          <a:solidFill>
-            <a:schemeClr val="bg1">
-              <a:lumMod val="85000"/>
-            </a:schemeClr>
-          </a:solidFill>
-          <a:ln w="12700"/>
-        </p:spPr>
-        <p:style>
-          <a:lnRef idx="2">
-            <a:schemeClr val="dk1"/>
-          </a:lnRef>
-          <a:fillRef idx="1">
-            <a:schemeClr val="lt1"/>
-          </a:fillRef>
-          <a:effectRef idx="0">
-            <a:schemeClr val="dk1"/>
-          </a:effectRef>
-          <a:fontRef idx="minor">
-            <a:schemeClr val="dk1"/>
-          </a:fontRef>
-        </p:style>
-        <p:txBody>
-          <a:bodyPr rtlCol="0" anchor="ctr"/>
-          <a:lstStyle/>
-          <a:p>
-            <a:pPr algn="ctr"/>
-            <a:r>
-              <a:rPr kumimoji="1" lang="en-US" altLang="ja-JP"/>
-              <a:t>Device Memory</a:t>
-            </a:r>
-            <a:endParaRPr kumimoji="1" lang="ja-JP" altLang="en-US"/>
-          </a:p>
-        </p:txBody>
-      </p:sp>
-      <p:sp>
-        <p:nvSpPr>
-          <p:cNvPr id="80" name="正方形/長方形 79"/>
-          <p:cNvSpPr/>
-          <p:nvPr/>
-        </p:nvSpPr>
-        <p:spPr>
-          <a:xfrm>
-            <a:off x="3529960" y="2354266"/>
-            <a:ext cx="1806743" cy="536879"/>
-          </a:xfrm>
-          <a:prstGeom prst="rect">
-            <a:avLst/>
-          </a:prstGeom>
-          <a:solidFill>
-            <a:schemeClr val="bg1">
-              <a:lumMod val="85000"/>
-            </a:schemeClr>
-          </a:solidFill>
-          <a:ln w="12700"/>
-        </p:spPr>
-        <p:style>
-          <a:lnRef idx="2">
-            <a:schemeClr val="dk1"/>
-          </a:lnRef>
-          <a:fillRef idx="1">
-            <a:schemeClr val="lt1"/>
-          </a:fillRef>
-          <a:effectRef idx="0">
-            <a:schemeClr val="dk1"/>
-          </a:effectRef>
-          <a:fontRef idx="minor">
-            <a:schemeClr val="dk1"/>
-          </a:fontRef>
-        </p:style>
-        <p:txBody>
-          <a:bodyPr rtlCol="0" anchor="ctr"/>
-          <a:lstStyle/>
-          <a:p>
-            <a:pPr algn="ctr"/>
-            <a:r>
-              <a:rPr lang="en-US" altLang="ja-JP"/>
-              <a:t>On-GPUboard</a:t>
-            </a:r>
-          </a:p>
-          <a:p>
-            <a:pPr algn="ctr"/>
-            <a:r>
-              <a:rPr lang="en-US" altLang="ja-JP"/>
-              <a:t>DMA Controller</a:t>
-            </a:r>
-            <a:endParaRPr kumimoji="1" lang="en-US" altLang="ja-JP"/>
-          </a:p>
-        </p:txBody>
-      </p:sp>
-      <p:sp>
-        <p:nvSpPr>
-          <p:cNvPr id="82" name="テキスト ボックス 81"/>
-          <p:cNvSpPr txBox="1"/>
-          <p:nvPr/>
-        </p:nvSpPr>
-        <p:spPr>
-          <a:xfrm>
-            <a:off x="4007280" y="3115410"/>
-            <a:ext cx="1034132" cy="307777"/>
-          </a:xfrm>
-          <a:prstGeom prst="rect">
-            <a:avLst/>
-          </a:prstGeom>
-          <a:noFill/>
-        </p:spPr>
-        <p:txBody>
-          <a:bodyPr wrap="none" rtlCol="0">
-            <a:spAutoFit/>
-          </a:bodyPr>
-          <a:lstStyle/>
-          <a:p>
-            <a:r>
-              <a:rPr kumimoji="1" lang="en-US" altLang="ja-JP" sz="1400"/>
-              <a:t>Read/Write</a:t>
-            </a:r>
-            <a:endParaRPr kumimoji="1" lang="ja-JP" altLang="en-US" sz="1400"/>
-          </a:p>
-        </p:txBody>
-      </p:sp>
-      <p:sp>
-        <p:nvSpPr>
-          <p:cNvPr id="27" name="正方形/長方形 26"/>
-          <p:cNvSpPr/>
-          <p:nvPr/>
-        </p:nvSpPr>
-        <p:spPr>
-          <a:xfrm>
-            <a:off x="6119914" y="2886240"/>
-            <a:ext cx="1806743" cy="268439"/>
-          </a:xfrm>
-          <a:prstGeom prst="rect">
-            <a:avLst/>
-          </a:prstGeom>
-          <a:ln w="12700"/>
-        </p:spPr>
-        <p:style>
-          <a:lnRef idx="2">
-            <a:schemeClr val="dk1"/>
-          </a:lnRef>
-          <a:fillRef idx="1">
-            <a:schemeClr val="lt1"/>
-          </a:fillRef>
-          <a:effectRef idx="0">
-            <a:schemeClr val="dk1"/>
-          </a:effectRef>
-          <a:fontRef idx="minor">
-            <a:schemeClr val="dk1"/>
-          </a:fontRef>
-        </p:style>
-        <p:txBody>
-          <a:bodyPr rtlCol="0" anchor="ctr"/>
-          <a:lstStyle/>
-          <a:p>
-            <a:pPr algn="ctr"/>
-            <a:endParaRPr lang="en-US" altLang="ja-JP" sz="1200"/>
+            <a:endParaRPr lang="en-US" altLang="ja-JP" sz="1600"/>
           </a:p>
         </p:txBody>
       </p:sp>
       <p:cxnSp>
         <p:nvCxnSpPr>
-          <p:cNvPr id="29" name="直線コネクタ 28"/>
-          <p:cNvCxnSpPr/>
+          <p:cNvPr id="37" name="直線コネクタ 36"/>
+          <p:cNvCxnSpPr>
+            <a:stCxn id="35" idx="3"/>
+          </p:cNvCxnSpPr>
           <p:nvPr/>
         </p:nvCxnSpPr>
         <p:spPr>
-          <a:xfrm flipH="1">
-            <a:off x="6119915" y="3002280"/>
-            <a:ext cx="1806742" cy="0"/>
+          <a:xfrm flipH="1" flipV="1">
+            <a:off x="6119912" y="3967480"/>
+            <a:ext cx="1906488" cy="7292"/>
           </a:xfrm>
           <a:prstGeom prst="line">
             <a:avLst/>
@@ -7175,64 +7323,84 @@
           </a:fontRef>
         </p:style>
       </p:cxnSp>
-      <p:sp>
-        <p:nvSpPr>
-          <p:cNvPr id="30" name="右大かっこ 29"/>
-          <p:cNvSpPr/>
-          <p:nvPr/>
-        </p:nvSpPr>
+      <p:cxnSp>
+        <p:nvCxnSpPr>
+          <p:cNvPr id="20" name="直線コネクタ 19"/>
+          <p:cNvCxnSpPr/>
+          <p:nvPr/>
+        </p:nvCxnSpPr>
         <p:spPr>
           <a:xfrm flipH="1">
-            <a:off x="5926216" y="3146434"/>
-            <a:ext cx="193698" cy="366613"/>
-          </a:xfrm>
-          <a:prstGeom prst="rightBracket">
-            <a:avLst>
-              <a:gd name="adj" fmla="val 29762"/>
-            </a:avLst>
+            <a:off x="988225" y="3624748"/>
+            <a:ext cx="1806742" cy="0"/>
+          </a:xfrm>
+          <a:prstGeom prst="line">
+            <a:avLst/>
           </a:prstGeom>
           <a:ln>
-            <a:solidFill>
-              <a:schemeClr val="tx1"/>
-            </a:solidFill>
+            <a:prstDash val="sysDash"/>
           </a:ln>
         </p:spPr>
         <p:style>
-          <a:lnRef idx="2">
-            <a:schemeClr val="accent1"/>
+          <a:lnRef idx="1">
+            <a:schemeClr val="dk1"/>
           </a:lnRef>
           <a:fillRef idx="0">
-            <a:schemeClr val="accent1"/>
+            <a:schemeClr val="dk1"/>
           </a:fillRef>
-          <a:effectRef idx="1">
-            <a:schemeClr val="accent1"/>
+          <a:effectRef idx="0">
+            <a:schemeClr val="dk1"/>
           </a:effectRef>
           <a:fontRef idx="minor">
             <a:schemeClr val="tx1"/>
           </a:fontRef>
         </p:style>
-        <p:txBody>
-          <a:bodyPr rtlCol="0" anchor="ctr"/>
-          <a:lstStyle/>
-          <a:p>
-            <a:pPr algn="ctr"/>
-            <a:endParaRPr kumimoji="1" lang="ja-JP" altLang="en-US"/>
-          </a:p>
-        </p:txBody>
-      </p:sp>
+      </p:cxnSp>
       <p:cxnSp>
         <p:nvCxnSpPr>
-          <p:cNvPr id="31" name="直線矢印コネクタ 30"/>
+          <p:cNvPr id="22" name="直線コネクタ 21"/>
+          <p:cNvCxnSpPr/>
+          <p:nvPr/>
+        </p:nvCxnSpPr>
+        <p:spPr>
+          <a:xfrm flipH="1">
+            <a:off x="988225" y="3307248"/>
+            <a:ext cx="1806742" cy="0"/>
+          </a:xfrm>
+          <a:prstGeom prst="line">
+            <a:avLst/>
+          </a:prstGeom>
+          <a:ln>
+            <a:prstDash val="sysDash"/>
+          </a:ln>
+        </p:spPr>
+        <p:style>
+          <a:lnRef idx="1">
+            <a:schemeClr val="dk1"/>
+          </a:lnRef>
+          <a:fillRef idx="0">
+            <a:schemeClr val="dk1"/>
+          </a:fillRef>
+          <a:effectRef idx="0">
+            <a:schemeClr val="dk1"/>
+          </a:effectRef>
+          <a:fontRef idx="minor">
+            <a:schemeClr val="tx1"/>
+          </a:fontRef>
+        </p:style>
+      </p:cxnSp>
+      <p:cxnSp>
+        <p:nvCxnSpPr>
+          <p:cNvPr id="25" name="直線矢印コネクタ 24"/>
           <p:cNvCxnSpPr>
             <a:stCxn id="80" idx="2"/>
-            <a:endCxn id="48" idx="2"/>
           </p:cNvCxnSpPr>
           <p:nvPr/>
         </p:nvCxnSpPr>
         <p:spPr>
           <a:xfrm flipH="1">
-            <a:off x="2995395" y="2891145"/>
-            <a:ext cx="1437937" cy="876416"/>
+            <a:off x="4433332" y="2891145"/>
+            <a:ext cx="6500" cy="493414"/>
           </a:xfrm>
           <a:prstGeom prst="straightConnector1">
             <a:avLst/>
@@ -7241,7 +7409,7 @@
             <a:solidFill>
               <a:schemeClr val="tx1"/>
             </a:solidFill>
-            <a:headEnd type="arrow"/>
+            <a:headEnd type="none"/>
             <a:tailEnd type="arrow"/>
           </a:ln>
           <a:effectLst/>
@@ -7263,76 +7431,34 @@
       </p:cxnSp>
       <p:sp>
         <p:nvSpPr>
-          <p:cNvPr id="35" name="正方形/長方形 34"/>
-          <p:cNvSpPr/>
+          <p:cNvPr id="32" name="テキスト ボックス 31"/>
+          <p:cNvSpPr txBox="1"/>
           <p:nvPr/>
         </p:nvSpPr>
         <p:spPr>
           <a:xfrm>
-            <a:off x="6119912" y="3525748"/>
-            <a:ext cx="1806743" cy="898047"/>
+            <a:off x="4433332" y="2925881"/>
+            <a:ext cx="1080832" cy="369332"/>
           </a:xfrm>
           <a:prstGeom prst="rect">
             <a:avLst/>
           </a:prstGeom>
-          <a:ln w="12700"/>
-        </p:spPr>
-        <p:style>
-          <a:lnRef idx="2">
-            <a:schemeClr val="dk1"/>
-          </a:lnRef>
-          <a:fillRef idx="1">
-            <a:schemeClr val="lt1"/>
-          </a:fillRef>
-          <a:effectRef idx="0">
-            <a:schemeClr val="dk1"/>
-          </a:effectRef>
-          <a:fontRef idx="minor">
-            <a:schemeClr val="dk1"/>
-          </a:fontRef>
-        </p:style>
-        <p:txBody>
-          <a:bodyPr rtlCol="0" anchor="ctr"/>
-          <a:lstStyle/>
-          <a:p>
-            <a:pPr algn="ctr"/>
-            <a:endParaRPr lang="en-US" altLang="ja-JP" sz="1200"/>
-          </a:p>
-        </p:txBody>
-      </p:sp>
-      <p:cxnSp>
-        <p:nvCxnSpPr>
-          <p:cNvPr id="37" name="直線コネクタ 36"/>
-          <p:cNvCxnSpPr/>
-          <p:nvPr/>
-        </p:nvCxnSpPr>
-        <p:spPr>
-          <a:xfrm flipH="1">
-            <a:off x="6119912" y="3967480"/>
-            <a:ext cx="1806742" cy="0"/>
-          </a:xfrm>
-          <a:prstGeom prst="line">
-            <a:avLst/>
-          </a:prstGeom>
-          <a:ln>
-            <a:prstDash val="sysDash"/>
-          </a:ln>
-        </p:spPr>
-        <p:style>
-          <a:lnRef idx="1">
-            <a:schemeClr val="dk1"/>
-          </a:lnRef>
-          <a:fillRef idx="0">
-            <a:schemeClr val="dk1"/>
-          </a:fillRef>
-          <a:effectRef idx="0">
-            <a:schemeClr val="dk1"/>
-          </a:effectRef>
-          <a:fontRef idx="minor">
-            <a:schemeClr val="tx1"/>
-          </a:fontRef>
-        </p:style>
-      </p:cxnSp>
+          <a:noFill/>
+        </p:spPr>
+        <p:txBody>
+          <a:bodyPr wrap="none" rtlCol="0">
+            <a:spAutoFit/>
+          </a:bodyPr>
+          <a:lstStyle/>
+          <a:p>
+            <a:r>
+              <a:rPr kumimoji="1" lang="en-US" altLang="ja-JP"/>
+              <a:t>Start/End </a:t>
+            </a:r>
+            <a:endParaRPr kumimoji="1" lang="ja-JP" altLang="en-US"/>
+          </a:p>
+        </p:txBody>
+      </p:sp>
     </p:spTree>
     <p:extLst>
       <p:ext uri="{BB962C8B-B14F-4D97-AF65-F5344CB8AC3E}">

</xml_diff>